<commit_message>
Updated SGW Project Update slides 29Nov17
</commit_message>
<xml_diff>
--- a/SGW Project Update (Final) 29Nov17.pptx
+++ b/SGW Project Update (Final) 29Nov17.pptx
@@ -5935,151 +5935,151 @@
     </dgm:pt>
   </dgm:ptLst>
   <dgm:cxnLst>
-    <dgm:cxn modelId="{B49A586B-AE06-4E2B-90D1-5B7A85C8C3E6}" type="presOf" srcId="{0C48992A-DA9E-416D-B351-F6CF3917497B}" destId="{ADD27B8D-46D3-4588-BB73-49AC77C35FF6}" srcOrd="0" destOrd="0" presId="urn:microsoft.com/office/officeart/2005/8/layout/orgChart1"/>
-    <dgm:cxn modelId="{016013A9-4DB3-4A92-A3FF-346A8DD93180}" srcId="{402192EA-635B-4E5A-BC30-CBA091CCA687}" destId="{412D8D73-F653-4132-AF48-FE332EE4AF61}" srcOrd="2" destOrd="0" parTransId="{0F3850D7-801C-4B55-B4EE-9750549084FF}" sibTransId="{EFC177A6-1831-46A1-945C-32C74CF2CF26}"/>
-    <dgm:cxn modelId="{A555CF3B-6D7A-4006-878A-1452242DA094}" type="presOf" srcId="{206FA317-2A95-4AFD-B801-ED2E3F52304B}" destId="{57F61604-BE15-4362-B346-71D638A88099}" srcOrd="1" destOrd="0" presId="urn:microsoft.com/office/officeart/2005/8/layout/orgChart1"/>
-    <dgm:cxn modelId="{F04F67C3-206C-46AA-8ACC-4C99D2CCEE71}" type="presOf" srcId="{A3998B0F-A5C6-48FE-B0BC-BF0B7E2B7081}" destId="{76159509-0BB5-44D0-976C-3983E2A2D266}" srcOrd="0" destOrd="0" presId="urn:microsoft.com/office/officeart/2005/8/layout/orgChart1"/>
-    <dgm:cxn modelId="{0577416B-B4C3-4654-8F13-8D8E24A33E34}" srcId="{0274927B-4160-4899-AF19-9671AA211A2B}" destId="{2FD0ACBE-A9EE-439B-BDD7-7D04768F5ECB}" srcOrd="7" destOrd="0" parTransId="{115D3D74-8A9E-46A5-8E17-2DD64D5CC212}" sibTransId="{47B2DB87-A5FE-4B74-B4D7-E946093551B1}"/>
-    <dgm:cxn modelId="{DDF707E9-2035-4608-828A-E407AFBAE157}" type="presOf" srcId="{1FD30924-7ED0-4217-A609-81C912422B24}" destId="{4A45F6A9-2CEE-4778-B464-5ADE39FD2424}" srcOrd="0" destOrd="0" presId="urn:microsoft.com/office/officeart/2005/8/layout/orgChart1"/>
-    <dgm:cxn modelId="{6FE0BA41-84C9-484B-8106-EAC3C9C5B1BA}" type="presOf" srcId="{54F52B91-96F3-4A93-8C51-4A8BFBEDFA33}" destId="{C2459311-6B3C-4BB4-94D4-CB66B518FA25}" srcOrd="1" destOrd="0" presId="urn:microsoft.com/office/officeart/2005/8/layout/orgChart1"/>
-    <dgm:cxn modelId="{A62D367F-D6F1-45C9-948B-633035A87407}" type="presOf" srcId="{1E3ABECC-8D21-4FCF-8F22-4047954C6620}" destId="{D27660A4-8C22-4AA8-8F93-D6A250C1942F}" srcOrd="1" destOrd="0" presId="urn:microsoft.com/office/officeart/2005/8/layout/orgChart1"/>
-    <dgm:cxn modelId="{0CD758EC-4E05-4204-9B69-2093ADE05E65}" type="presOf" srcId="{A7E6D440-D1BC-47AB-A4BC-6364938D11FE}" destId="{4408F1D1-8DD2-418C-ABAE-49A9C1656FFB}" srcOrd="1" destOrd="0" presId="urn:microsoft.com/office/officeart/2005/8/layout/orgChart1"/>
-    <dgm:cxn modelId="{ED37DA95-C391-4824-A0AF-8C0144EBA658}" type="presOf" srcId="{37682145-075D-4526-BE74-A2FD14772674}" destId="{3C43E7A2-C899-4FF3-A54E-8B1DADF7F1D8}" srcOrd="0" destOrd="0" presId="urn:microsoft.com/office/officeart/2005/8/layout/orgChart1"/>
-    <dgm:cxn modelId="{E07B96CB-88FA-4D04-A2ED-EEEC9516069D}" type="presOf" srcId="{BA44C836-44DF-4853-AFD4-C5FBD868FEDE}" destId="{AC413AD4-05E8-4882-B724-048726377750}" srcOrd="0" destOrd="0" presId="urn:microsoft.com/office/officeart/2005/8/layout/orgChart1"/>
-    <dgm:cxn modelId="{597EA3C6-690C-4F99-ADC8-91DFADD01181}" srcId="{CF25F756-588F-4C1B-9591-BB613EE272CB}" destId="{CF2D02B9-0D4C-438A-9A09-36265FCD126F}" srcOrd="3" destOrd="0" parTransId="{4576AD9C-8D01-4FF0-8AC4-65179B9664FE}" sibTransId="{FA63D66A-DDD5-4F5D-B3BF-62E3A3C4FC88}"/>
-    <dgm:cxn modelId="{3054077A-94E7-4869-B8D3-3D9AA04F5C7F}" srcId="{2FD0ACBE-A9EE-439B-BDD7-7D04768F5ECB}" destId="{1FD30924-7ED0-4217-A609-81C912422B24}" srcOrd="1" destOrd="0" parTransId="{6667787B-8278-48F1-A8AA-4BBEBED29AC7}" sibTransId="{020A0A2D-B354-4262-9D66-D305EF074DEE}"/>
-    <dgm:cxn modelId="{100248C7-0071-442A-B6BE-64EB2D85B686}" type="presOf" srcId="{B9B43DA7-88E6-405B-80FE-1DEC167B1B1B}" destId="{013CEFBA-B0C8-4E53-B75F-CB4965CD6E21}" srcOrd="0" destOrd="0" presId="urn:microsoft.com/office/officeart/2005/8/layout/orgChart1"/>
-    <dgm:cxn modelId="{7DD2DEBE-FD31-42D9-853D-A07CDDFC492A}" srcId="{54F52B91-96F3-4A93-8C51-4A8BFBEDFA33}" destId="{A326D562-FC53-441D-9269-0AED7029A99A}" srcOrd="2" destOrd="0" parTransId="{B9B43DA7-88E6-405B-80FE-1DEC167B1B1B}" sibTransId="{E384CD7F-CCD7-4EBB-B2D8-242295143101}"/>
-    <dgm:cxn modelId="{06EFAC49-7BD8-4764-9ADD-0827E5679D1A}" type="presOf" srcId="{F841F772-F263-44DB-AF9F-DD29A8A41A82}" destId="{2F56B4D2-400A-48F1-9F86-328A9D96FD6A}" srcOrd="0" destOrd="0" presId="urn:microsoft.com/office/officeart/2005/8/layout/orgChart1"/>
-    <dgm:cxn modelId="{E5408A45-9A01-47D5-B725-662A37C3340C}" srcId="{CF25F756-588F-4C1B-9591-BB613EE272CB}" destId="{99D9C4F3-84D0-4398-BA5C-83FCBD76B890}" srcOrd="2" destOrd="0" parTransId="{3A25750F-ADFB-4D21-B8B6-684EEA04E5D7}" sibTransId="{F42F600E-F4EB-47EA-A759-12F2ADD0ABF2}"/>
-    <dgm:cxn modelId="{22A2DE11-AF36-45BE-9AFC-F21A6B434EA9}" type="presOf" srcId="{CF2D02B9-0D4C-438A-9A09-36265FCD126F}" destId="{D5DB1BF8-7727-41DB-8711-7758CBC1CD9E}" srcOrd="1" destOrd="0" presId="urn:microsoft.com/office/officeart/2005/8/layout/orgChart1"/>
-    <dgm:cxn modelId="{69670487-BB5E-4DD8-94C1-F8F7AD3FEB48}" type="presOf" srcId="{FC3BE7C2-CAF1-4079-9560-5489769EFC27}" destId="{C33C7A6C-C6C4-41AC-8DE1-8DDEFEB60920}" srcOrd="0" destOrd="0" presId="urn:microsoft.com/office/officeart/2005/8/layout/orgChart1"/>
-    <dgm:cxn modelId="{721B8B6A-B60A-4FC9-B228-A79D3958DB03}" srcId="{3045B1B2-DC0A-4607-ACC9-6EA0209878F6}" destId="{0C48992A-DA9E-416D-B351-F6CF3917497B}" srcOrd="1" destOrd="0" parTransId="{7C6E53BB-7621-4B9E-B8AB-2A5789109803}" sibTransId="{BEFB7897-8604-43A3-978F-CBD7C072936F}"/>
-    <dgm:cxn modelId="{19160D59-3830-4B6B-A796-8E47F1B0F2A9}" type="presOf" srcId="{04BB0C87-6F2D-4619-8302-191948EC74A6}" destId="{D3CE8887-ABBE-448D-AE41-463E6DCE7983}" srcOrd="0" destOrd="0" presId="urn:microsoft.com/office/officeart/2005/8/layout/orgChart1"/>
-    <dgm:cxn modelId="{42B09E8C-E277-4CE8-BD53-7BE557AE411F}" srcId="{402192EA-635B-4E5A-BC30-CBA091CCA687}" destId="{1E3ABECC-8D21-4FCF-8F22-4047954C6620}" srcOrd="1" destOrd="0" parTransId="{04BB0C87-6F2D-4619-8302-191948EC74A6}" sibTransId="{1D40B57F-B1D3-4540-9467-5C23E68DD271}"/>
-    <dgm:cxn modelId="{FD2626E4-053E-40E0-83E1-7D629CF0B604}" type="presOf" srcId="{B5CEA2D4-A899-4C2C-BA30-79C7F0302244}" destId="{E6677268-D00C-4D1B-A6D9-295F28778097}" srcOrd="0" destOrd="0" presId="urn:microsoft.com/office/officeart/2005/8/layout/orgChart1"/>
-    <dgm:cxn modelId="{DFEDE867-48E6-4653-B4DE-8A158690D9BF}" type="presOf" srcId="{3F86936B-1FD6-48A0-A250-2B1EB4CB5592}" destId="{95757365-1776-4A05-B177-ECC651A46341}" srcOrd="0" destOrd="0" presId="urn:microsoft.com/office/officeart/2005/8/layout/orgChart1"/>
-    <dgm:cxn modelId="{14DC938D-5A1A-4182-AD1D-CAD3871111F1}" type="presOf" srcId="{49114A9B-D2E0-4713-9DBF-1B7318FD9E27}" destId="{E3166F7C-DF17-441D-9FD5-AE90B21D5054}" srcOrd="0" destOrd="0" presId="urn:microsoft.com/office/officeart/2005/8/layout/orgChart1"/>
-    <dgm:cxn modelId="{D1EE69A5-CE67-4A71-8269-F6C0D6072F8B}" type="presOf" srcId="{402192EA-635B-4E5A-BC30-CBA091CCA687}" destId="{53F64DE1-C267-4768-9640-9F5FECF761EF}" srcOrd="0" destOrd="0" presId="urn:microsoft.com/office/officeart/2005/8/layout/orgChart1"/>
-    <dgm:cxn modelId="{58A822BC-4324-4C11-9953-E33339B426F8}" type="presOf" srcId="{412D8D73-F653-4132-AF48-FE332EE4AF61}" destId="{C78F9AFE-E8E1-46DE-9FB8-48A10E9F107A}" srcOrd="1" destOrd="0" presId="urn:microsoft.com/office/officeart/2005/8/layout/orgChart1"/>
-    <dgm:cxn modelId="{4B7B7DD5-1C45-4290-9567-0C46071A681C}" type="presOf" srcId="{6558A57C-4982-4A47-B2B2-8AABE7345991}" destId="{0845B1E8-7FE0-46CA-B690-B70A34907BDB}" srcOrd="0" destOrd="0" presId="urn:microsoft.com/office/officeart/2005/8/layout/orgChart1"/>
-    <dgm:cxn modelId="{FE190A70-81DD-4CD5-A132-B05B37B66F18}" type="presOf" srcId="{04A842A6-3D2B-45FE-B6D1-65F0829EE722}" destId="{03285AB4-389B-4A8E-A739-E4FB594C24BF}" srcOrd="1" destOrd="0" presId="urn:microsoft.com/office/officeart/2005/8/layout/orgChart1"/>
-    <dgm:cxn modelId="{6A465CF3-98E3-45D0-926F-4FEE0C58DA00}" type="presOf" srcId="{3F86936B-1FD6-48A0-A250-2B1EB4CB5592}" destId="{E522034E-B4F4-45A6-9472-9FE4651F335F}" srcOrd="1" destOrd="0" presId="urn:microsoft.com/office/officeart/2005/8/layout/orgChart1"/>
-    <dgm:cxn modelId="{470E3917-08F0-42CB-912C-B34C1DCEB9F2}" srcId="{B5CEA2D4-A899-4C2C-BA30-79C7F0302244}" destId="{EB3B4FD7-4B93-4B6A-85DA-411D4E46D809}" srcOrd="6" destOrd="0" parTransId="{FD513F68-9504-4F45-8DCD-794B58A4EE29}" sibTransId="{6D02A1A6-8951-4138-A89A-B2061701541A}"/>
-    <dgm:cxn modelId="{F67A02AC-85B2-42B8-A820-7DEF1E7361EB}" type="presOf" srcId="{58F003E5-0E8F-43B2-BD78-8704859781FC}" destId="{D94F6F4E-3CAA-4D71-98C2-5B11B32EE224}" srcOrd="0" destOrd="0" presId="urn:microsoft.com/office/officeart/2005/8/layout/orgChart1"/>
-    <dgm:cxn modelId="{D7A869B9-A235-4A03-8708-11142952F8E0}" type="presOf" srcId="{FD513F68-9504-4F45-8DCD-794B58A4EE29}" destId="{5C2972FE-C97E-42B6-9A79-1CF8DC5B6AE4}" srcOrd="0" destOrd="0" presId="urn:microsoft.com/office/officeart/2005/8/layout/orgChart1"/>
-    <dgm:cxn modelId="{9FC193A4-03AC-4295-92F4-898FF17C109A}" type="presOf" srcId="{412D8D73-F653-4132-AF48-FE332EE4AF61}" destId="{FEE3C8F0-336B-4489-B1F3-DF952E1353C6}" srcOrd="0" destOrd="0" presId="urn:microsoft.com/office/officeart/2005/8/layout/orgChart1"/>
-    <dgm:cxn modelId="{50D354AA-25C4-4669-8671-798B6D692070}" type="presOf" srcId="{1FD30924-7ED0-4217-A609-81C912422B24}" destId="{70DD15F4-9873-4C92-A83A-F5A2BD26FFD0}" srcOrd="1" destOrd="0" presId="urn:microsoft.com/office/officeart/2005/8/layout/orgChart1"/>
-    <dgm:cxn modelId="{DA37DDB8-F839-49E3-932C-607C037A154C}" type="presOf" srcId="{882C9CBD-8965-4D73-98D7-54F437501BE5}" destId="{8AAA2FD4-9B65-444C-904F-66481EA57F57}" srcOrd="0" destOrd="0" presId="urn:microsoft.com/office/officeart/2005/8/layout/orgChart1"/>
-    <dgm:cxn modelId="{CC707C10-30E4-40AF-BC9D-BE2CADB67311}" type="presOf" srcId="{A9751E97-5308-409A-BD37-D117ED6BF809}" destId="{15F2BC78-D50C-4AAD-8B4C-69F04EAC3A17}" srcOrd="0" destOrd="0" presId="urn:microsoft.com/office/officeart/2005/8/layout/orgChart1"/>
-    <dgm:cxn modelId="{B700AD6E-5BC5-4351-823A-F027F62105DE}" type="presOf" srcId="{B76B37EA-7611-4BE2-8A94-945B0806F9F6}" destId="{4936C0EE-735B-4022-A21D-F437E8C8FB2C}" srcOrd="0" destOrd="0" presId="urn:microsoft.com/office/officeart/2005/8/layout/orgChart1"/>
-    <dgm:cxn modelId="{D1DA9795-902A-4EFC-ACBD-D0B328D51683}" type="presOf" srcId="{BC73FEC3-7BE4-4F76-A05A-FAEB1EC6BC05}" destId="{1256D7E3-FC8E-4DD7-B64E-2DF45B28EE68}" srcOrd="0" destOrd="0" presId="urn:microsoft.com/office/officeart/2005/8/layout/orgChart1"/>
-    <dgm:cxn modelId="{BF5FCEE2-4EB7-4E57-8969-BE056AE3821D}" type="presOf" srcId="{BD1DDD68-A030-4E56-A78C-C045A20D5260}" destId="{16A9F9D7-3787-4714-911F-99186952F738}" srcOrd="1" destOrd="0" presId="urn:microsoft.com/office/officeart/2005/8/layout/orgChart1"/>
-    <dgm:cxn modelId="{5B0DDF4B-18B0-4D7D-A20F-2A537B8B66D3}" type="presOf" srcId="{A6569C1B-F779-4BE0-969E-A2AFB0425B84}" destId="{58FCFA12-57FF-4DDE-AA78-FD5F24D44BE5}" srcOrd="0" destOrd="0" presId="urn:microsoft.com/office/officeart/2005/8/layout/orgChart1"/>
-    <dgm:cxn modelId="{F8B84352-7516-48D1-A3F3-ADBAD23C3891}" type="presOf" srcId="{8B86F944-694A-43B9-BD2C-86002A138388}" destId="{97C1ADA8-C573-433C-A903-2B5AF2D11025}" srcOrd="0" destOrd="0" presId="urn:microsoft.com/office/officeart/2005/8/layout/orgChart1"/>
-    <dgm:cxn modelId="{E7AA101C-9C77-4C3E-A93C-CCB15112DD7F}" type="presOf" srcId="{7EE8E44F-0C3A-4679-96F1-03029899B8F6}" destId="{4BD3313B-B6CB-42FE-90CB-13EA1BBA4C78}" srcOrd="0" destOrd="0" presId="urn:microsoft.com/office/officeart/2005/8/layout/orgChart1"/>
-    <dgm:cxn modelId="{59FFE1AD-8C0D-40B1-A691-61008CC1ABAD}" type="presOf" srcId="{70C0C7BE-A049-472C-960B-F3918754FB25}" destId="{0A62653C-0DF8-4EDF-A01B-23209F9F26F9}" srcOrd="0" destOrd="0" presId="urn:microsoft.com/office/officeart/2005/8/layout/orgChart1"/>
-    <dgm:cxn modelId="{B9D2C6A1-FB92-4CB6-89F3-EE1C8943AFCD}" type="presOf" srcId="{C7416EEA-DB93-48CB-9F21-97C8588E35DD}" destId="{A2F494B7-1FD7-47D3-91A2-9B488590CB64}" srcOrd="0" destOrd="0" presId="urn:microsoft.com/office/officeart/2005/8/layout/orgChart1"/>
-    <dgm:cxn modelId="{87450A5A-4F4F-4447-BA30-90EB2B02B568}" type="presOf" srcId="{7C6E53BB-7621-4B9E-B8AB-2A5789109803}" destId="{90856F93-6928-4F29-A715-1CCE16DEB8CE}" srcOrd="0" destOrd="0" presId="urn:microsoft.com/office/officeart/2005/8/layout/orgChart1"/>
-    <dgm:cxn modelId="{98F07B5B-75D3-49F7-94A0-F7D9A2F6451E}" srcId="{54F52B91-96F3-4A93-8C51-4A8BFBEDFA33}" destId="{BA44C836-44DF-4853-AFD4-C5FBD868FEDE}" srcOrd="1" destOrd="0" parTransId="{BC73FEC3-7BE4-4F76-A05A-FAEB1EC6BC05}" sibTransId="{6ADE4D33-09B9-4239-A019-D8A168ED53FD}"/>
-    <dgm:cxn modelId="{8FA63312-87F1-41CF-BC5D-7FAD2845B45B}" srcId="{54F52B91-96F3-4A93-8C51-4A8BFBEDFA33}" destId="{F841F772-F263-44DB-AF9F-DD29A8A41A82}" srcOrd="4" destOrd="0" parTransId="{A6569C1B-F779-4BE0-969E-A2AFB0425B84}" sibTransId="{7ACBF141-9D50-4E5D-AF94-B41447F98FD8}"/>
-    <dgm:cxn modelId="{351DA048-9305-491F-9DB2-0EFFCAAA38D0}" type="presOf" srcId="{254F2FB9-B8B1-45E2-A82F-4EBBA8D47F7E}" destId="{6320A880-F80E-4CF8-8C28-17D03A432C6C}" srcOrd="1" destOrd="0" presId="urn:microsoft.com/office/officeart/2005/8/layout/orgChart1"/>
-    <dgm:cxn modelId="{C756083A-26FF-4525-8C0F-23D1A569FB42}" type="presOf" srcId="{5C8EBEB2-45CA-4875-B2C1-3A80FFD2AC67}" destId="{08D8DD80-F8DB-42D4-8B5F-8F3E6B33839A}" srcOrd="1" destOrd="0" presId="urn:microsoft.com/office/officeart/2005/8/layout/orgChart1"/>
-    <dgm:cxn modelId="{357D4004-2F17-41A2-980A-2135141568A0}" type="presOf" srcId="{EB3B4FD7-4B93-4B6A-85DA-411D4E46D809}" destId="{BF212140-F00B-41BB-95FA-AB60DEA3AD26}" srcOrd="0" destOrd="0" presId="urn:microsoft.com/office/officeart/2005/8/layout/orgChart1"/>
-    <dgm:cxn modelId="{3EC205AC-F5AA-4AEB-B49B-9BD19BE72918}" type="presOf" srcId="{A326D562-FC53-441D-9269-0AED7029A99A}" destId="{CFFDF423-B662-42D5-91DA-0A745D4CA88E}" srcOrd="0" destOrd="0" presId="urn:microsoft.com/office/officeart/2005/8/layout/orgChart1"/>
-    <dgm:cxn modelId="{32B27E00-4A2B-438E-9358-0D07D4FBEC71}" type="presOf" srcId="{1E3ABECC-8D21-4FCF-8F22-4047954C6620}" destId="{F0432EA2-E586-4C57-9E74-B7DC627F4296}" srcOrd="0" destOrd="0" presId="urn:microsoft.com/office/officeart/2005/8/layout/orgChart1"/>
-    <dgm:cxn modelId="{22C3688E-89D7-44C2-BDD9-D342528EB643}" type="presOf" srcId="{1B000D60-51F0-4F7C-BE26-B6213BFA4932}" destId="{ACAD718D-61C1-406A-BAF6-C6FC780B3F8C}" srcOrd="0" destOrd="0" presId="urn:microsoft.com/office/officeart/2005/8/layout/orgChart1"/>
-    <dgm:cxn modelId="{04BD9444-96F5-4F9F-96D6-6E5D8150702D}" srcId="{3045B1B2-DC0A-4607-ACC9-6EA0209878F6}" destId="{3741E197-C607-4BAC-A29B-066FB2751C91}" srcOrd="3" destOrd="0" parTransId="{13F23037-5BD1-4678-8671-2EBB7A37F8AB}" sibTransId="{74813959-29CD-4409-BACF-AE9B76174F0E}"/>
-    <dgm:cxn modelId="{0283F55E-E9EF-483C-A91C-656CC9944F9F}" srcId="{0274927B-4160-4899-AF19-9671AA211A2B}" destId="{B5CEA2D4-A899-4C2C-BA30-79C7F0302244}" srcOrd="4" destOrd="0" parTransId="{8B86F944-694A-43B9-BD2C-86002A138388}" sibTransId="{8B06C467-0364-4F8F-862D-C3FE609451FC}"/>
-    <dgm:cxn modelId="{FCCC79B5-D75C-469A-91D6-EB45F1420DEB}" type="presOf" srcId="{3741E197-C607-4BAC-A29B-066FB2751C91}" destId="{4304F539-04CE-41DE-AB0A-040F37901232}" srcOrd="0" destOrd="0" presId="urn:microsoft.com/office/officeart/2005/8/layout/orgChart1"/>
-    <dgm:cxn modelId="{C913FD22-4830-479B-8D0B-C63B9BEF77E3}" srcId="{0274927B-4160-4899-AF19-9671AA211A2B}" destId="{402192EA-635B-4E5A-BC30-CBA091CCA687}" srcOrd="8" destOrd="0" parTransId="{58F003E5-0E8F-43B2-BD78-8704859781FC}" sibTransId="{6DD285F6-212B-4270-B8AA-A5F40C494517}"/>
+    <dgm:cxn modelId="{DC27B880-EA96-47D5-9E93-8DD52D5E4786}" type="presOf" srcId="{F6903CF6-6A4F-4541-A359-24FE5D01E33B}" destId="{FD7D4D9F-8B82-4134-A440-E709162FB101}" srcOrd="0" destOrd="0" presId="urn:microsoft.com/office/officeart/2005/8/layout/orgChart1"/>
     <dgm:cxn modelId="{9C765D7D-D345-4229-AC54-153C4EF70A9E}" type="presOf" srcId="{54F52B91-96F3-4A93-8C51-4A8BFBEDFA33}" destId="{951AA7AC-1C1A-47BB-A6DA-7AE5C0C55E85}" srcOrd="0" destOrd="0" presId="urn:microsoft.com/office/officeart/2005/8/layout/orgChart1"/>
     <dgm:cxn modelId="{54A9ED18-AB38-4DE6-85C8-B26F8D7773CF}" type="presOf" srcId="{F7A70203-5488-40A0-9132-52AF0CCC0865}" destId="{0AD1E2AE-974D-4F7C-AFCD-74206E1B3B56}" srcOrd="0" destOrd="0" presId="urn:microsoft.com/office/officeart/2005/8/layout/orgChart1"/>
-    <dgm:cxn modelId="{498AC11B-4E30-41CF-90E0-EFAFC934B926}" type="presOf" srcId="{254F2FB9-B8B1-45E2-A82F-4EBBA8D47F7E}" destId="{AE0DAA20-8A17-469F-A2AE-7E1D1148B1A8}" srcOrd="0" destOrd="0" presId="urn:microsoft.com/office/officeart/2005/8/layout/orgChart1"/>
-    <dgm:cxn modelId="{C008063F-1F1E-4934-8A59-A7B4187AD825}" srcId="{B5CEA2D4-A899-4C2C-BA30-79C7F0302244}" destId="{206FA317-2A95-4AFD-B801-ED2E3F52304B}" srcOrd="2" destOrd="0" parTransId="{463DAE48-7CE6-4E11-AAB1-77194570CA13}" sibTransId="{D951AF62-7ECE-4764-8F28-FC9C836D48FD}"/>
-    <dgm:cxn modelId="{FD50899F-F26F-4C11-83D7-40684D29EC93}" srcId="{B5CEA2D4-A899-4C2C-BA30-79C7F0302244}" destId="{6D36762B-FB57-4DEA-90CD-3F097F4D25CC}" srcOrd="5" destOrd="0" parTransId="{F3C2A341-069D-4991-8990-61DFFDB62E32}" sibTransId="{AED57AF9-10F1-4CD6-9667-9BB1699AF639}"/>
-    <dgm:cxn modelId="{4D5C523A-0C9E-43C2-9C57-9F61B6D03848}" type="presOf" srcId="{49114A9B-D2E0-4713-9DBF-1B7318FD9E27}" destId="{D5BAEF3F-BD35-4D7E-A4FF-F30965920AFA}" srcOrd="1" destOrd="0" presId="urn:microsoft.com/office/officeart/2005/8/layout/orgChart1"/>
-    <dgm:cxn modelId="{6849EB16-EAB4-459C-93FE-5958DCB06504}" type="presOf" srcId="{CF25F756-588F-4C1B-9591-BB613EE272CB}" destId="{DB6D70D1-1334-4D38-846C-FFDB7A9BF7E5}" srcOrd="0" destOrd="0" presId="urn:microsoft.com/office/officeart/2005/8/layout/orgChart1"/>
-    <dgm:cxn modelId="{9D58EBE9-B38C-439F-A03D-5FEF45F8D98B}" srcId="{3045B1B2-DC0A-4607-ACC9-6EA0209878F6}" destId="{1707DDAA-FF7D-469D-B0BB-E186BF94AAE6}" srcOrd="4" destOrd="0" parTransId="{70C0C7BE-A049-472C-960B-F3918754FB25}" sibTransId="{C3A86372-A69D-4D81-BEFE-2C5701038283}"/>
-    <dgm:cxn modelId="{1AB163AD-36C3-47C8-A3E4-8FC509D1385C}" type="presOf" srcId="{04A842A6-3D2B-45FE-B6D1-65F0829EE722}" destId="{641A9226-B231-4E8E-9C55-F68651D94D4E}" srcOrd="0" destOrd="0" presId="urn:microsoft.com/office/officeart/2005/8/layout/orgChart1"/>
-    <dgm:cxn modelId="{8483C8D2-1419-4A30-9BD1-5286CA25BFEE}" srcId="{0274927B-4160-4899-AF19-9671AA211A2B}" destId="{02E8AF3B-DB86-4F9A-8D46-27D7319E4BB8}" srcOrd="9" destOrd="0" parTransId="{8017E421-4010-47DD-B3A2-150D7F01784C}" sibTransId="{4CCAA9F6-7FF4-460F-8B35-21E70EA635D7}"/>
-    <dgm:cxn modelId="{9D5A7CD4-7BE6-4DA0-ADC9-D59AA3A73DD7}" type="presOf" srcId="{B5CEA2D4-A899-4C2C-BA30-79C7F0302244}" destId="{2B0A4C06-23E2-4C10-ACD4-A1381D5956C7}" srcOrd="1" destOrd="0" presId="urn:microsoft.com/office/officeart/2005/8/layout/orgChart1"/>
+    <dgm:cxn modelId="{F7ED06D6-5207-47C2-98C5-929CD70B2081}" type="presOf" srcId="{A7E6D440-D1BC-47AB-A4BC-6364938D11FE}" destId="{88E42A67-50A6-46C1-A655-A67481AF8CF9}" srcOrd="0" destOrd="0" presId="urn:microsoft.com/office/officeart/2005/8/layout/orgChart1"/>
+    <dgm:cxn modelId="{E8DEFCBC-D8F5-4C50-B869-E4B3A644D307}" type="presOf" srcId="{6D36762B-FB57-4DEA-90CD-3F097F4D25CC}" destId="{D9ED388C-CEBD-4853-9A3E-C27037FF2C56}" srcOrd="1" destOrd="0" presId="urn:microsoft.com/office/officeart/2005/8/layout/orgChart1"/>
+    <dgm:cxn modelId="{36BDA124-864F-43FE-B765-FA109A9C0381}" srcId="{3045B1B2-DC0A-4607-ACC9-6EA0209878F6}" destId="{5C8EBEB2-45CA-4875-B2C1-3A80FFD2AC67}" srcOrd="0" destOrd="0" parTransId="{AA3915FE-4491-42CC-A1AF-70CBC148FF59}" sibTransId="{87CF262D-40B1-4CCD-A406-357431074C01}"/>
+    <dgm:cxn modelId="{58A822BC-4324-4C11-9953-E33339B426F8}" type="presOf" srcId="{412D8D73-F653-4132-AF48-FE332EE4AF61}" destId="{C78F9AFE-E8E1-46DE-9FB8-48A10E9F107A}" srcOrd="1" destOrd="0" presId="urn:microsoft.com/office/officeart/2005/8/layout/orgChart1"/>
+    <dgm:cxn modelId="{C1C74712-BFAD-46F4-9825-14DF62A02B66}" type="presOf" srcId="{1707DDAA-FF7D-469D-B0BB-E186BF94AAE6}" destId="{9C2D6E1B-1D6A-40AE-936F-284B7321FF42}" srcOrd="0" destOrd="0" presId="urn:microsoft.com/office/officeart/2005/8/layout/orgChart1"/>
     <dgm:cxn modelId="{D12C1163-FB58-47E3-96C1-AB92D53FCF73}" type="presOf" srcId="{DDFB70BB-5443-40C0-B689-C60571A5518C}" destId="{99A7B5F4-03C8-4B46-A613-6DFFD2A72B9A}" srcOrd="0" destOrd="0" presId="urn:microsoft.com/office/officeart/2005/8/layout/orgChart1"/>
+    <dgm:cxn modelId="{7E4922A3-4F53-4FA0-906A-1FA5D06307FD}" type="presOf" srcId="{9511AE43-BA7F-49B2-BA3B-266CB9B06C28}" destId="{539C9AB9-A71B-47D2-BAFA-A26EF16D35E9}" srcOrd="0" destOrd="0" presId="urn:microsoft.com/office/officeart/2005/8/layout/orgChart1"/>
     <dgm:cxn modelId="{6C6EFDF5-AE23-4111-A69D-E67706804180}" type="presOf" srcId="{9212E598-9C44-43E3-A9F6-848C3F7B98C6}" destId="{629D144A-42A8-455E-BD11-F11473E53343}" srcOrd="0" destOrd="0" presId="urn:microsoft.com/office/officeart/2005/8/layout/orgChart1"/>
-    <dgm:cxn modelId="{DF45DDA9-300C-4F5A-A0F2-D6B2B1E7E504}" type="presOf" srcId="{F3C2A341-069D-4991-8990-61DFFDB62E32}" destId="{41D8D129-29D8-4385-B786-894926FEDC42}" srcOrd="0" destOrd="0" presId="urn:microsoft.com/office/officeart/2005/8/layout/orgChart1"/>
-    <dgm:cxn modelId="{A8C7DFBA-C23C-4D4E-8726-46FEF9E0F913}" type="presOf" srcId="{0274927B-4160-4899-AF19-9671AA211A2B}" destId="{25FA3ADB-37ED-43D8-B4C9-DE7BAE16907E}" srcOrd="0" destOrd="0" presId="urn:microsoft.com/office/officeart/2005/8/layout/orgChart1"/>
-    <dgm:cxn modelId="{FC0172BA-7B78-4E80-B61B-F0285D59D85D}" type="presOf" srcId="{8017E421-4010-47DD-B3A2-150D7F01784C}" destId="{E897A794-E666-4DCD-89D5-3E766B270427}" srcOrd="0" destOrd="0" presId="urn:microsoft.com/office/officeart/2005/8/layout/orgChart1"/>
-    <dgm:cxn modelId="{B5B971D0-4807-41A3-8C03-DA3994D72631}" type="presOf" srcId="{2FD0ACBE-A9EE-439B-BDD7-7D04768F5ECB}" destId="{7BD2452F-63BA-4404-A09F-0848D6551F58}" srcOrd="0" destOrd="0" presId="urn:microsoft.com/office/officeart/2005/8/layout/orgChart1"/>
-    <dgm:cxn modelId="{A06DB7F6-C37E-4DF7-9C57-31CEA4982969}" type="presOf" srcId="{EF945DD0-6504-45B1-B65D-422FF7CEE416}" destId="{FAA0A73B-BE57-4EBF-BC6E-02688DD94992}" srcOrd="0" destOrd="0" presId="urn:microsoft.com/office/officeart/2005/8/layout/orgChart1"/>
-    <dgm:cxn modelId="{99306810-C422-4A11-B504-A746C310C603}" srcId="{CF25F756-588F-4C1B-9591-BB613EE272CB}" destId="{0274927B-4160-4899-AF19-9671AA211A2B}" srcOrd="0" destOrd="0" parTransId="{2AED433D-0597-4258-B441-18772D8834FD}" sibTransId="{A88DCB20-EF2C-4111-AE84-9D6560A02F3F}"/>
+    <dgm:cxn modelId="{7DD2DEBE-FD31-42D9-853D-A07CDDFC492A}" srcId="{54F52B91-96F3-4A93-8C51-4A8BFBEDFA33}" destId="{A326D562-FC53-441D-9269-0AED7029A99A}" srcOrd="2" destOrd="0" parTransId="{B9B43DA7-88E6-405B-80FE-1DEC167B1B1B}" sibTransId="{E384CD7F-CCD7-4EBB-B2D8-242295143101}"/>
+    <dgm:cxn modelId="{6FE0BA41-84C9-484B-8106-EAC3C9C5B1BA}" type="presOf" srcId="{54F52B91-96F3-4A93-8C51-4A8BFBEDFA33}" destId="{C2459311-6B3C-4BB4-94D4-CB66B518FA25}" srcOrd="1" destOrd="0" presId="urn:microsoft.com/office/officeart/2005/8/layout/orgChart1"/>
+    <dgm:cxn modelId="{A3621D76-B265-4375-A938-10D0C0A42B63}" type="presOf" srcId="{6D36762B-FB57-4DEA-90CD-3F097F4D25CC}" destId="{92C0FB43-53F4-4321-BEF9-66199300F0E8}" srcOrd="0" destOrd="0" presId="urn:microsoft.com/office/officeart/2005/8/layout/orgChart1"/>
+    <dgm:cxn modelId="{68D85CC6-9308-4348-A2D3-267308B44407}" type="presOf" srcId="{832D0428-C81C-4895-8335-E8EDA9233ED3}" destId="{149078CD-1B5B-412D-A0CE-202071623540}" srcOrd="1" destOrd="0" presId="urn:microsoft.com/office/officeart/2005/8/layout/orgChart1"/>
+    <dgm:cxn modelId="{008B2416-FAB5-4C16-BD79-600BE5082038}" type="presOf" srcId="{99D9C4F3-84D0-4398-BA5C-83FCBD76B890}" destId="{C4B0F77B-E2E0-457D-812E-29E9BE3E4085}" srcOrd="0" destOrd="0" presId="urn:microsoft.com/office/officeart/2005/8/layout/orgChart1"/>
+    <dgm:cxn modelId="{E25F962B-32A8-4DF6-A89E-C6BDBE3B3721}" type="presOf" srcId="{5320F88E-D563-4578-9D4B-CD929B72BF81}" destId="{1F31A3CC-47E9-4C73-8E01-7B95861616D0}" srcOrd="0" destOrd="0" presId="urn:microsoft.com/office/officeart/2005/8/layout/orgChart1"/>
+    <dgm:cxn modelId="{C3EBA6E8-8C2D-4B2D-87D1-1771BBCD0A21}" type="presOf" srcId="{BA44C836-44DF-4853-AFD4-C5FBD868FEDE}" destId="{798AF196-C9E6-4068-8D9C-E6C02EBD0190}" srcOrd="1" destOrd="0" presId="urn:microsoft.com/office/officeart/2005/8/layout/orgChart1"/>
+    <dgm:cxn modelId="{3054077A-94E7-4869-B8D3-3D9AA04F5C7F}" srcId="{2FD0ACBE-A9EE-439B-BDD7-7D04768F5ECB}" destId="{1FD30924-7ED0-4217-A609-81C912422B24}" srcOrd="1" destOrd="0" parTransId="{6667787B-8278-48F1-A8AA-4BBEBED29AC7}" sibTransId="{020A0A2D-B354-4262-9D66-D305EF074DEE}"/>
+    <dgm:cxn modelId="{6ACA8C6C-A003-44D7-8B46-FF5578882501}" type="presOf" srcId="{115D3D74-8A9E-46A5-8E17-2DD64D5CC212}" destId="{6FFED9C4-696B-4ABA-A003-AB2F5D1066AB}" srcOrd="0" destOrd="0" presId="urn:microsoft.com/office/officeart/2005/8/layout/orgChart1"/>
+    <dgm:cxn modelId="{9BBD892C-C3FA-4558-9DFE-DC35A7D75B48}" type="presOf" srcId="{402192EA-635B-4E5A-BC30-CBA091CCA687}" destId="{831B417E-D813-4576-8428-B6F99D5216F6}" srcOrd="1" destOrd="0" presId="urn:microsoft.com/office/officeart/2005/8/layout/orgChart1"/>
+    <dgm:cxn modelId="{522C70D9-2B01-48E7-A639-421F155223C8}" type="presOf" srcId="{1707DDAA-FF7D-469D-B0BB-E186BF94AAE6}" destId="{3596B5AD-F16B-4ED3-96AA-D3FE4FDF760F}" srcOrd="1" destOrd="0" presId="urn:microsoft.com/office/officeart/2005/8/layout/orgChart1"/>
+    <dgm:cxn modelId="{3EE2FB32-DEBE-4EF5-A7AC-DBC5320AAB86}" type="presOf" srcId="{C88AE6E3-0700-4F24-88F8-01A94F1EFDD0}" destId="{20D19837-0E96-49A9-A9CC-3C434CEB5CA5}" srcOrd="1" destOrd="0" presId="urn:microsoft.com/office/officeart/2005/8/layout/orgChart1"/>
     <dgm:cxn modelId="{61D39E35-017D-4D78-8435-8376A8E3A971}" type="presOf" srcId="{72681D1D-992C-46E4-9A0C-549E18C36AF4}" destId="{AC81D29A-1E8E-4858-9F79-82979B5F5404}" srcOrd="0" destOrd="0" presId="urn:microsoft.com/office/officeart/2005/8/layout/orgChart1"/>
-    <dgm:cxn modelId="{008B2416-FAB5-4C16-BD79-600BE5082038}" type="presOf" srcId="{99D9C4F3-84D0-4398-BA5C-83FCBD76B890}" destId="{C4B0F77B-E2E0-457D-812E-29E9BE3E4085}" srcOrd="0" destOrd="0" presId="urn:microsoft.com/office/officeart/2005/8/layout/orgChart1"/>
-    <dgm:cxn modelId="{DC27B880-EA96-47D5-9E93-8DD52D5E4786}" type="presOf" srcId="{F6903CF6-6A4F-4541-A359-24FE5D01E33B}" destId="{FD7D4D9F-8B82-4134-A440-E709162FB101}" srcOrd="0" destOrd="0" presId="urn:microsoft.com/office/officeart/2005/8/layout/orgChart1"/>
-    <dgm:cxn modelId="{DA94338E-2B85-4A3A-8C36-94C03E7C18D6}" type="presOf" srcId="{CF2D02B9-0D4C-438A-9A09-36265FCD126F}" destId="{DC286486-1041-4CF2-B1D9-ED9F8D4CAF4B}" srcOrd="0" destOrd="0" presId="urn:microsoft.com/office/officeart/2005/8/layout/orgChart1"/>
+    <dgm:cxn modelId="{1032A209-123D-4C8F-842E-4B40FE90968D}" type="presOf" srcId="{2FD0ACBE-A9EE-439B-BDD7-7D04768F5ECB}" destId="{A135AE1E-C7DE-4D38-BF64-3DB4EBB55480}" srcOrd="1" destOrd="0" presId="urn:microsoft.com/office/officeart/2005/8/layout/orgChart1"/>
+    <dgm:cxn modelId="{4BDA56F7-0741-4184-A1C9-D3ABAA158281}" type="presOf" srcId="{EB3B4FD7-4B93-4B6A-85DA-411D4E46D809}" destId="{586BD3CC-D024-49AE-98A9-57447680C793}" srcOrd="1" destOrd="0" presId="urn:microsoft.com/office/officeart/2005/8/layout/orgChart1"/>
+    <dgm:cxn modelId="{AAA020C6-E2F1-4FCD-97BC-637EFFB70E8B}" srcId="{B5CEA2D4-A899-4C2C-BA30-79C7F0302244}" destId="{A9751E97-5308-409A-BD37-D117ED6BF809}" srcOrd="1" destOrd="0" parTransId="{B76B37EA-7611-4BE2-8A94-945B0806F9F6}" sibTransId="{9222EC89-35DE-4ED9-8619-5ACD4F38A454}"/>
+    <dgm:cxn modelId="{B700AD6E-5BC5-4351-823A-F027F62105DE}" type="presOf" srcId="{B76B37EA-7611-4BE2-8A94-945B0806F9F6}" destId="{4936C0EE-735B-4022-A21D-F437E8C8FB2C}" srcOrd="0" destOrd="0" presId="urn:microsoft.com/office/officeart/2005/8/layout/orgChart1"/>
+    <dgm:cxn modelId="{7F517A2A-0306-48E3-A919-C246FF2DC6B0}" srcId="{B5CEA2D4-A899-4C2C-BA30-79C7F0302244}" destId="{DDFB70BB-5443-40C0-B689-C60571A5518C}" srcOrd="0" destOrd="0" parTransId="{72681D1D-992C-46E4-9A0C-549E18C36AF4}" sibTransId="{462D0B24-89DF-49EA-B7D4-AC77E4A14273}"/>
+    <dgm:cxn modelId="{14DC938D-5A1A-4182-AD1D-CAD3871111F1}" type="presOf" srcId="{49114A9B-D2E0-4713-9DBF-1B7318FD9E27}" destId="{E3166F7C-DF17-441D-9FD5-AE90B21D5054}" srcOrd="0" destOrd="0" presId="urn:microsoft.com/office/officeart/2005/8/layout/orgChart1"/>
+    <dgm:cxn modelId="{3EC205AC-F5AA-4AEB-B49B-9BD19BE72918}" type="presOf" srcId="{A326D562-FC53-441D-9269-0AED7029A99A}" destId="{CFFDF423-B662-42D5-91DA-0A745D4CA88E}" srcOrd="0" destOrd="0" presId="urn:microsoft.com/office/officeart/2005/8/layout/orgChart1"/>
     <dgm:cxn modelId="{3A99C259-0D49-41B3-A046-3B7C8BCB2E36}" type="presOf" srcId="{A326D562-FC53-441D-9269-0AED7029A99A}" destId="{E6CB73C8-18AD-4E4D-AE69-1F66714D57E7}" srcOrd="1" destOrd="0" presId="urn:microsoft.com/office/officeart/2005/8/layout/orgChart1"/>
     <dgm:cxn modelId="{D407C968-7B37-4AC5-BAE5-53670733AE77}" srcId="{0274927B-4160-4899-AF19-9671AA211A2B}" destId="{3045B1B2-DC0A-4607-ACC9-6EA0209878F6}" srcOrd="6" destOrd="0" parTransId="{FC3BE7C2-CAF1-4079-9560-5489769EFC27}" sibTransId="{7575C62C-8AC3-4892-8DE6-501D67B8487C}"/>
+    <dgm:cxn modelId="{2BAC5D6B-87B8-43A9-AA90-4785C31A5090}" type="presOf" srcId="{FDC9F48B-2A97-42BB-A94D-14DD284B616A}" destId="{604E9955-A4D8-4EF3-AB62-04F2B6924221}" srcOrd="1" destOrd="0" presId="urn:microsoft.com/office/officeart/2005/8/layout/orgChart1"/>
+    <dgm:cxn modelId="{DA37DDB8-F839-49E3-932C-607C037A154C}" type="presOf" srcId="{882C9CBD-8965-4D73-98D7-54F437501BE5}" destId="{8AAA2FD4-9B65-444C-904F-66481EA57F57}" srcOrd="0" destOrd="0" presId="urn:microsoft.com/office/officeart/2005/8/layout/orgChart1"/>
+    <dgm:cxn modelId="{E5408A45-9A01-47D5-B725-662A37C3340C}" srcId="{CF25F756-588F-4C1B-9591-BB613EE272CB}" destId="{99D9C4F3-84D0-4398-BA5C-83FCBD76B890}" srcOrd="2" destOrd="0" parTransId="{3A25750F-ADFB-4D21-B8B6-684EEA04E5D7}" sibTransId="{F42F600E-F4EB-47EA-A759-12F2ADD0ABF2}"/>
+    <dgm:cxn modelId="{06D06D46-FD79-4889-9656-8271F1A511BE}" type="presOf" srcId="{0C48992A-DA9E-416D-B351-F6CF3917497B}" destId="{B8EF8860-201E-4A47-880F-FE1C62264548}" srcOrd="1" destOrd="0" presId="urn:microsoft.com/office/officeart/2005/8/layout/orgChart1"/>
+    <dgm:cxn modelId="{32B05402-4727-4432-8E1C-DF813FE80087}" type="presOf" srcId="{AA3915FE-4491-42CC-A1AF-70CBC148FF59}" destId="{E9FA3E35-E17C-402A-9F06-8A140AF13D6A}" srcOrd="0" destOrd="0" presId="urn:microsoft.com/office/officeart/2005/8/layout/orgChart1"/>
+    <dgm:cxn modelId="{3A786003-D049-407B-BE7C-6286F6201166}" type="presOf" srcId="{463DAE48-7CE6-4E11-AAB1-77194570CA13}" destId="{613C03D6-7054-4B73-96F2-78EDD8671AF2}" srcOrd="0" destOrd="0" presId="urn:microsoft.com/office/officeart/2005/8/layout/orgChart1"/>
+    <dgm:cxn modelId="{E7AA101C-9C77-4C3E-A93C-CCB15112DD7F}" type="presOf" srcId="{7EE8E44F-0C3A-4679-96F1-03029899B8F6}" destId="{4BD3313B-B6CB-42FE-90CB-13EA1BBA4C78}" srcOrd="0" destOrd="0" presId="urn:microsoft.com/office/officeart/2005/8/layout/orgChart1"/>
+    <dgm:cxn modelId="{6849EB16-EAB4-459C-93FE-5958DCB06504}" type="presOf" srcId="{CF25F756-588F-4C1B-9591-BB613EE272CB}" destId="{DB6D70D1-1334-4D38-846C-FFDB7A9BF7E5}" srcOrd="0" destOrd="0" presId="urn:microsoft.com/office/officeart/2005/8/layout/orgChart1"/>
+    <dgm:cxn modelId="{A8C7DFBA-C23C-4D4E-8726-46FEF9E0F913}" type="presOf" srcId="{0274927B-4160-4899-AF19-9671AA211A2B}" destId="{25FA3ADB-37ED-43D8-B4C9-DE7BAE16907E}" srcOrd="0" destOrd="0" presId="urn:microsoft.com/office/officeart/2005/8/layout/orgChart1"/>
+    <dgm:cxn modelId="{87450A5A-4F4F-4447-BA30-90EB2B02B568}" type="presOf" srcId="{7C6E53BB-7621-4B9E-B8AB-2A5789109803}" destId="{90856F93-6928-4F29-A715-1CCE16DEB8CE}" srcOrd="0" destOrd="0" presId="urn:microsoft.com/office/officeart/2005/8/layout/orgChart1"/>
+    <dgm:cxn modelId="{9FC193A4-03AC-4295-92F4-898FF17C109A}" type="presOf" srcId="{412D8D73-F653-4132-AF48-FE332EE4AF61}" destId="{FEE3C8F0-336B-4489-B1F3-DF952E1353C6}" srcOrd="0" destOrd="0" presId="urn:microsoft.com/office/officeart/2005/8/layout/orgChart1"/>
+    <dgm:cxn modelId="{DA94338E-2B85-4A3A-8C36-94C03E7C18D6}" type="presOf" srcId="{CF2D02B9-0D4C-438A-9A09-36265FCD126F}" destId="{DC286486-1041-4CF2-B1D9-ED9F8D4CAF4B}" srcOrd="0" destOrd="0" presId="urn:microsoft.com/office/officeart/2005/8/layout/orgChart1"/>
+    <dgm:cxn modelId="{597EA3C6-690C-4F99-ADC8-91DFADD01181}" srcId="{CF25F756-588F-4C1B-9591-BB613EE272CB}" destId="{CF2D02B9-0D4C-438A-9A09-36265FCD126F}" srcOrd="3" destOrd="0" parTransId="{4576AD9C-8D01-4FF0-8AC4-65179B9664FE}" sibTransId="{FA63D66A-DDD5-4F5D-B3BF-62E3A3C4FC88}"/>
+    <dgm:cxn modelId="{04BD9444-96F5-4F9F-96D6-6E5D8150702D}" srcId="{3045B1B2-DC0A-4607-ACC9-6EA0209878F6}" destId="{3741E197-C607-4BAC-A29B-066FB2751C91}" srcOrd="3" destOrd="0" parTransId="{13F23037-5BD1-4678-8671-2EBB7A37F8AB}" sibTransId="{74813959-29CD-4409-BACF-AE9B76174F0E}"/>
+    <dgm:cxn modelId="{A06DB7F6-C37E-4DF7-9C57-31CEA4982969}" type="presOf" srcId="{EF945DD0-6504-45B1-B65D-422FF7CEE416}" destId="{FAA0A73B-BE57-4EBF-BC6E-02688DD94992}" srcOrd="0" destOrd="0" presId="urn:microsoft.com/office/officeart/2005/8/layout/orgChart1"/>
+    <dgm:cxn modelId="{ADEF9F17-174F-4038-BCB4-AB1A61B400DD}" type="presOf" srcId="{37682145-075D-4526-BE74-A2FD14772674}" destId="{F2328742-AD42-44F6-93EE-FB64E22017C9}" srcOrd="1" destOrd="0" presId="urn:microsoft.com/office/officeart/2005/8/layout/orgChart1"/>
+    <dgm:cxn modelId="{8FA63312-87F1-41CF-BC5D-7FAD2845B45B}" srcId="{54F52B91-96F3-4A93-8C51-4A8BFBEDFA33}" destId="{F841F772-F263-44DB-AF9F-DD29A8A41A82}" srcOrd="4" destOrd="0" parTransId="{A6569C1B-F779-4BE0-969E-A2AFB0425B84}" sibTransId="{7ACBF141-9D50-4E5D-AF94-B41447F98FD8}"/>
+    <dgm:cxn modelId="{B5B971D0-4807-41A3-8C03-DA3994D72631}" type="presOf" srcId="{2FD0ACBE-A9EE-439B-BDD7-7D04768F5ECB}" destId="{7BD2452F-63BA-4404-A09F-0848D6551F58}" srcOrd="0" destOrd="0" presId="urn:microsoft.com/office/officeart/2005/8/layout/orgChart1"/>
+    <dgm:cxn modelId="{42B09E8C-E277-4CE8-BD53-7BE557AE411F}" srcId="{402192EA-635B-4E5A-BC30-CBA091CCA687}" destId="{1E3ABECC-8D21-4FCF-8F22-4047954C6620}" srcOrd="1" destOrd="0" parTransId="{04BB0C87-6F2D-4619-8302-191948EC74A6}" sibTransId="{1D40B57F-B1D3-4540-9467-5C23E68DD271}"/>
+    <dgm:cxn modelId="{4D5C523A-0C9E-43C2-9C57-9F61B6D03848}" type="presOf" srcId="{49114A9B-D2E0-4713-9DBF-1B7318FD9E27}" destId="{D5BAEF3F-BD35-4D7E-A4FF-F30965920AFA}" srcOrd="1" destOrd="0" presId="urn:microsoft.com/office/officeart/2005/8/layout/orgChart1"/>
+    <dgm:cxn modelId="{9D58EBE9-B38C-439F-A03D-5FEF45F8D98B}" srcId="{3045B1B2-DC0A-4607-ACC9-6EA0209878F6}" destId="{1707DDAA-FF7D-469D-B0BB-E186BF94AAE6}" srcOrd="4" destOrd="0" parTransId="{70C0C7BE-A049-472C-960B-F3918754FB25}" sibTransId="{C3A86372-A69D-4D81-BEFE-2C5701038283}"/>
+    <dgm:cxn modelId="{D1DA9795-902A-4EFC-ACBD-D0B328D51683}" type="presOf" srcId="{BC73FEC3-7BE4-4F76-A05A-FAEB1EC6BC05}" destId="{1256D7E3-FC8E-4DD7-B64E-2DF45B28EE68}" srcOrd="0" destOrd="0" presId="urn:microsoft.com/office/officeart/2005/8/layout/orgChart1"/>
+    <dgm:cxn modelId="{470E3917-08F0-42CB-912C-B34C1DCEB9F2}" srcId="{B5CEA2D4-A899-4C2C-BA30-79C7F0302244}" destId="{EB3B4FD7-4B93-4B6A-85DA-411D4E46D809}" srcOrd="6" destOrd="0" parTransId="{FD513F68-9504-4F45-8DCD-794B58A4EE29}" sibTransId="{6D02A1A6-8951-4138-A89A-B2061701541A}"/>
+    <dgm:cxn modelId="{6A465CF3-98E3-45D0-926F-4FEE0C58DA00}" type="presOf" srcId="{3F86936B-1FD6-48A0-A250-2B1EB4CB5592}" destId="{E522034E-B4F4-45A6-9472-9FE4651F335F}" srcOrd="1" destOrd="0" presId="urn:microsoft.com/office/officeart/2005/8/layout/orgChart1"/>
+    <dgm:cxn modelId="{B7676EF7-348B-4418-AB74-58B4DD511791}" type="presOf" srcId="{5C8EBEB2-45CA-4875-B2C1-3A80FFD2AC67}" destId="{37209606-A253-48BC-A588-886B49BABBD1}" srcOrd="0" destOrd="0" presId="urn:microsoft.com/office/officeart/2005/8/layout/orgChart1"/>
+    <dgm:cxn modelId="{85026290-96D5-4D0F-9075-6ECB10EE9BFA}" srcId="{B5CEA2D4-A899-4C2C-BA30-79C7F0302244}" destId="{49114A9B-D2E0-4713-9DBF-1B7318FD9E27}" srcOrd="4" destOrd="0" parTransId="{9511AE43-BA7F-49B2-BA3B-266CB9B06C28}" sibTransId="{E3FE093F-97A4-4DFF-8A60-A5C2CF1AA222}"/>
+    <dgm:cxn modelId="{496869C1-252A-47F6-977A-AAD0A5DF36CD}" type="presOf" srcId="{0514F8A1-4B60-46B1-9B43-60C5F0627DF1}" destId="{8A46CCD3-1595-4057-9247-6F1A420CF6FC}" srcOrd="0" destOrd="0" presId="urn:microsoft.com/office/officeart/2005/8/layout/orgChart1"/>
+    <dgm:cxn modelId="{D7A869B9-A235-4A03-8708-11142952F8E0}" type="presOf" srcId="{FD513F68-9504-4F45-8DCD-794B58A4EE29}" destId="{5C2972FE-C97E-42B6-9A79-1CF8DC5B6AE4}" srcOrd="0" destOrd="0" presId="urn:microsoft.com/office/officeart/2005/8/layout/orgChart1"/>
+    <dgm:cxn modelId="{98F07B5B-75D3-49F7-94A0-F7D9A2F6451E}" srcId="{54F52B91-96F3-4A93-8C51-4A8BFBEDFA33}" destId="{BA44C836-44DF-4853-AFD4-C5FBD868FEDE}" srcOrd="1" destOrd="0" parTransId="{BC73FEC3-7BE4-4F76-A05A-FAEB1EC6BC05}" sibTransId="{6ADE4D33-09B9-4239-A019-D8A168ED53FD}"/>
+    <dgm:cxn modelId="{0283F55E-E9EF-483C-A91C-656CC9944F9F}" srcId="{0274927B-4160-4899-AF19-9671AA211A2B}" destId="{B5CEA2D4-A899-4C2C-BA30-79C7F0302244}" srcOrd="4" destOrd="0" parTransId="{8B86F944-694A-43B9-BD2C-86002A138388}" sibTransId="{8B06C467-0364-4F8F-862D-C3FE609451FC}"/>
+    <dgm:cxn modelId="{D1EE69A5-CE67-4A71-8269-F6C0D6072F8B}" type="presOf" srcId="{402192EA-635B-4E5A-BC30-CBA091CCA687}" destId="{53F64DE1-C267-4768-9640-9F5FECF761EF}" srcOrd="0" destOrd="0" presId="urn:microsoft.com/office/officeart/2005/8/layout/orgChart1"/>
+    <dgm:cxn modelId="{FCCC79B5-D75C-469A-91D6-EB45F1420DEB}" type="presOf" srcId="{3741E197-C607-4BAC-A29B-066FB2751C91}" destId="{4304F539-04CE-41DE-AB0A-040F37901232}" srcOrd="0" destOrd="0" presId="urn:microsoft.com/office/officeart/2005/8/layout/orgChart1"/>
+    <dgm:cxn modelId="{1F78DAA5-930D-4A06-9D7C-F711202F05E2}" srcId="{2FD0ACBE-A9EE-439B-BDD7-7D04768F5ECB}" destId="{254F2FB9-B8B1-45E2-A82F-4EBBA8D47F7E}" srcOrd="2" destOrd="0" parTransId="{7EE8E44F-0C3A-4679-96F1-03029899B8F6}" sibTransId="{0F138ECC-36AB-47A5-86BF-E34CB11279B0}"/>
+    <dgm:cxn modelId="{22C3688E-89D7-44C2-BDD9-D342528EB643}" type="presOf" srcId="{1B000D60-51F0-4F7C-BE26-B6213BFA4932}" destId="{ACAD718D-61C1-406A-BAF6-C6FC780B3F8C}" srcOrd="0" destOrd="0" presId="urn:microsoft.com/office/officeart/2005/8/layout/orgChart1"/>
+    <dgm:cxn modelId="{CC6C2AB1-69AD-4C55-944B-2488ABAC2C31}" srcId="{54F52B91-96F3-4A93-8C51-4A8BFBEDFA33}" destId="{9212E598-9C44-43E3-A9F6-848C3F7B98C6}" srcOrd="0" destOrd="0" parTransId="{A3998B0F-A5C6-48FE-B0BC-BF0B7E2B7081}" sibTransId="{8F01BDFD-242D-4425-AA2F-94FB37A1DABF}"/>
+    <dgm:cxn modelId="{FC0172BA-7B78-4E80-B61B-F0285D59D85D}" type="presOf" srcId="{8017E421-4010-47DD-B3A2-150D7F01784C}" destId="{E897A794-E666-4DCD-89D5-3E766B270427}" srcOrd="0" destOrd="0" presId="urn:microsoft.com/office/officeart/2005/8/layout/orgChart1"/>
+    <dgm:cxn modelId="{419E7F53-7DD8-4D1F-90D9-CDE59C63B3CF}" srcId="{0274927B-4160-4899-AF19-9671AA211A2B}" destId="{832D0428-C81C-4895-8335-E8EDA9233ED3}" srcOrd="1" destOrd="0" parTransId="{E51BC5A4-9C0D-4258-B89D-D0AE1ABE08D8}" sibTransId="{F6B1AA2B-235E-4C17-88CA-E0378EFC754E}"/>
+    <dgm:cxn modelId="{4B7B7DD5-1C45-4290-9567-0C46071A681C}" type="presOf" srcId="{6558A57C-4982-4A47-B2B2-8AABE7345991}" destId="{0845B1E8-7FE0-46CA-B690-B70A34907BDB}" srcOrd="0" destOrd="0" presId="urn:microsoft.com/office/officeart/2005/8/layout/orgChart1"/>
+    <dgm:cxn modelId="{DFEDE867-48E6-4653-B4DE-8A158690D9BF}" type="presOf" srcId="{3F86936B-1FD6-48A0-A250-2B1EB4CB5592}" destId="{95757365-1776-4A05-B177-ECC651A46341}" srcOrd="0" destOrd="0" presId="urn:microsoft.com/office/officeart/2005/8/layout/orgChart1"/>
+    <dgm:cxn modelId="{19160D59-3830-4B6B-A796-8E47F1B0F2A9}" type="presOf" srcId="{04BB0C87-6F2D-4619-8302-191948EC74A6}" destId="{D3CE8887-ABBE-448D-AE41-463E6DCE7983}" srcOrd="0" destOrd="0" presId="urn:microsoft.com/office/officeart/2005/8/layout/orgChart1"/>
+    <dgm:cxn modelId="{A1FB16BD-AC41-4AC9-938C-E954F2E19DF7}" type="presOf" srcId="{0F3850D7-801C-4B55-B4EE-9750549084FF}" destId="{08B4D769-2DB8-4026-BE5A-65BB0EFF9F14}" srcOrd="0" destOrd="0" presId="urn:microsoft.com/office/officeart/2005/8/layout/orgChart1"/>
+    <dgm:cxn modelId="{7954354A-A23E-42B6-840A-962221585393}" srcId="{CF25F756-588F-4C1B-9591-BB613EE272CB}" destId="{C4DD8EDD-E995-4C25-AFF8-F83A3553FAF9}" srcOrd="1" destOrd="0" parTransId="{0E88CAD0-4595-4D4B-A0AC-4CD7353C555C}" sibTransId="{A1AE32C3-045C-49F6-8F2E-1508D00C4D8D}"/>
+    <dgm:cxn modelId="{CC707C10-30E4-40AF-BC9D-BE2CADB67311}" type="presOf" srcId="{A9751E97-5308-409A-BD37-D117ED6BF809}" destId="{15F2BC78-D50C-4AAD-8B4C-69F04EAC3A17}" srcOrd="0" destOrd="0" presId="urn:microsoft.com/office/officeart/2005/8/layout/orgChart1"/>
+    <dgm:cxn modelId="{EF2F0D8B-E84D-4DB1-B83A-84360FCF9F03}" type="presOf" srcId="{A9751E97-5308-409A-BD37-D117ED6BF809}" destId="{4F17F90F-8BD4-4804-A10D-0E0D98F92923}" srcOrd="1" destOrd="0" presId="urn:microsoft.com/office/officeart/2005/8/layout/orgChart1"/>
+    <dgm:cxn modelId="{B9D2C6A1-FB92-4CB6-89F3-EE1C8943AFCD}" type="presOf" srcId="{C7416EEA-DB93-48CB-9F21-97C8588E35DD}" destId="{A2F494B7-1FD7-47D3-91A2-9B488590CB64}" srcOrd="0" destOrd="0" presId="urn:microsoft.com/office/officeart/2005/8/layout/orgChart1"/>
+    <dgm:cxn modelId="{B920FDA4-A114-4410-B52A-4B8C6F900B9D}" srcId="{54F52B91-96F3-4A93-8C51-4A8BFBEDFA33}" destId="{37682145-075D-4526-BE74-A2FD14772674}" srcOrd="3" destOrd="0" parTransId="{C7416EEA-DB93-48CB-9F21-97C8588E35DD}" sibTransId="{070BD383-E262-4C90-83CA-403E164C32E9}"/>
+    <dgm:cxn modelId="{C913FD22-4830-479B-8D0B-C63B9BEF77E3}" srcId="{0274927B-4160-4899-AF19-9671AA211A2B}" destId="{402192EA-635B-4E5A-BC30-CBA091CCA687}" srcOrd="8" destOrd="0" parTransId="{58F003E5-0E8F-43B2-BD78-8704859781FC}" sibTransId="{6DD285F6-212B-4270-B8AA-A5F40C494517}"/>
+    <dgm:cxn modelId="{3C19EA0D-1E85-4588-BF93-9653EC6E2CFF}" type="presOf" srcId="{99D9C4F3-84D0-4398-BA5C-83FCBD76B890}" destId="{17805C60-C0CE-46BF-BA01-F8C5D9F70B79}" srcOrd="1" destOrd="0" presId="urn:microsoft.com/office/officeart/2005/8/layout/orgChart1"/>
+    <dgm:cxn modelId="{351DA048-9305-491F-9DB2-0EFFCAAA38D0}" type="presOf" srcId="{254F2FB9-B8B1-45E2-A82F-4EBBA8D47F7E}" destId="{6320A880-F80E-4CF8-8C28-17D03A432C6C}" srcOrd="1" destOrd="0" presId="urn:microsoft.com/office/officeart/2005/8/layout/orgChart1"/>
+    <dgm:cxn modelId="{715E57C6-0910-476B-B0D0-7296428EADF8}" type="presOf" srcId="{3045B1B2-DC0A-4607-ACC9-6EA0209878F6}" destId="{B6A114D4-4B75-4F1E-A379-E402CD10E6C4}" srcOrd="1" destOrd="0" presId="urn:microsoft.com/office/officeart/2005/8/layout/orgChart1"/>
+    <dgm:cxn modelId="{E07B96CB-88FA-4D04-A2ED-EEEC9516069D}" type="presOf" srcId="{BA44C836-44DF-4853-AFD4-C5FBD868FEDE}" destId="{AC413AD4-05E8-4882-B724-048726377750}" srcOrd="0" destOrd="0" presId="urn:microsoft.com/office/officeart/2005/8/layout/orgChart1"/>
+    <dgm:cxn modelId="{357D4004-2F17-41A2-980A-2135141568A0}" type="presOf" srcId="{EB3B4FD7-4B93-4B6A-85DA-411D4E46D809}" destId="{BF212140-F00B-41BB-95FA-AB60DEA3AD26}" srcOrd="0" destOrd="0" presId="urn:microsoft.com/office/officeart/2005/8/layout/orgChart1"/>
+    <dgm:cxn modelId="{A484D727-9DCA-46E6-A296-0B75B0A169A7}" type="presOf" srcId="{DDFB70BB-5443-40C0-B689-C60571A5518C}" destId="{3DBEEB83-7DEB-44CB-AC9D-62897A2D4C10}" srcOrd="1" destOrd="0" presId="urn:microsoft.com/office/officeart/2005/8/layout/orgChart1"/>
+    <dgm:cxn modelId="{DDF707E9-2035-4608-828A-E407AFBAE157}" type="presOf" srcId="{1FD30924-7ED0-4217-A609-81C912422B24}" destId="{4A45F6A9-2CEE-4778-B464-5ADE39FD2424}" srcOrd="0" destOrd="0" presId="urn:microsoft.com/office/officeart/2005/8/layout/orgChart1"/>
+    <dgm:cxn modelId="{95E58B78-5D9A-44E6-BB6A-DE511F49FD76}" type="presOf" srcId="{9212E598-9C44-43E3-A9F6-848C3F7B98C6}" destId="{62F83636-57B9-481E-B7D7-8B7EBC51A031}" srcOrd="1" destOrd="0" presId="urn:microsoft.com/office/officeart/2005/8/layout/orgChart1"/>
+    <dgm:cxn modelId="{100248C7-0071-442A-B6BE-64EB2D85B686}" type="presOf" srcId="{B9B43DA7-88E6-405B-80FE-1DEC167B1B1B}" destId="{013CEFBA-B0C8-4E53-B75F-CB4965CD6E21}" srcOrd="0" destOrd="0" presId="urn:microsoft.com/office/officeart/2005/8/layout/orgChart1"/>
+    <dgm:cxn modelId="{F8B84352-7516-48D1-A3F3-ADBAD23C3891}" type="presOf" srcId="{8B86F944-694A-43B9-BD2C-86002A138388}" destId="{97C1ADA8-C573-433C-A903-2B5AF2D11025}" srcOrd="0" destOrd="0" presId="urn:microsoft.com/office/officeart/2005/8/layout/orgChart1"/>
+    <dgm:cxn modelId="{D2ABC662-1AF9-4909-B9FD-0244068A5D15}" srcId="{0274927B-4160-4899-AF19-9671AA211A2B}" destId="{FDC9F48B-2A97-42BB-A94D-14DD284B616A}" srcOrd="0" destOrd="0" parTransId="{EF945DD0-6504-45B1-B65D-422FF7CEE416}" sibTransId="{DFBEF7FD-6A4D-43F9-AEF4-4EB26978CE13}"/>
+    <dgm:cxn modelId="{BF5FCEE2-4EB7-4E57-8969-BE056AE3821D}" type="presOf" srcId="{BD1DDD68-A030-4E56-A78C-C045A20D5260}" destId="{16A9F9D7-3787-4714-911F-99186952F738}" srcOrd="1" destOrd="0" presId="urn:microsoft.com/office/officeart/2005/8/layout/orgChart1"/>
+    <dgm:cxn modelId="{B49A586B-AE06-4E2B-90D1-5B7A85C8C3E6}" type="presOf" srcId="{0C48992A-DA9E-416D-B351-F6CF3917497B}" destId="{ADD27B8D-46D3-4588-BB73-49AC77C35FF6}" srcOrd="0" destOrd="0" presId="urn:microsoft.com/office/officeart/2005/8/layout/orgChart1"/>
+    <dgm:cxn modelId="{5B0DDF4B-18B0-4D7D-A20F-2A537B8B66D3}" type="presOf" srcId="{A6569C1B-F779-4BE0-969E-A2AFB0425B84}" destId="{58FCFA12-57FF-4DDE-AA78-FD5F24D44BE5}" srcOrd="0" destOrd="0" presId="urn:microsoft.com/office/officeart/2005/8/layout/orgChart1"/>
+    <dgm:cxn modelId="{0CD758EC-4E05-4204-9B69-2093ADE05E65}" type="presOf" srcId="{A7E6D440-D1BC-47AB-A4BC-6364938D11FE}" destId="{4408F1D1-8DD2-418C-ABAE-49A9C1656FFB}" srcOrd="1" destOrd="0" presId="urn:microsoft.com/office/officeart/2005/8/layout/orgChart1"/>
+    <dgm:cxn modelId="{A555CF3B-6D7A-4006-878A-1452242DA094}" type="presOf" srcId="{206FA317-2A95-4AFD-B801-ED2E3F52304B}" destId="{57F61604-BE15-4362-B346-71D638A88099}" srcOrd="1" destOrd="0" presId="urn:microsoft.com/office/officeart/2005/8/layout/orgChart1"/>
+    <dgm:cxn modelId="{BB40391B-57C1-41E3-882B-65032869AED0}" type="presOf" srcId="{C4DD8EDD-E995-4C25-AFF8-F83A3553FAF9}" destId="{234957EB-CEAB-4D64-9578-75C67240B327}" srcOrd="0" destOrd="0" presId="urn:microsoft.com/office/officeart/2005/8/layout/orgChart1"/>
+    <dgm:cxn modelId="{8D25119B-2033-406A-9B33-714A1C4121E9}" type="presOf" srcId="{206FA317-2A95-4AFD-B801-ED2E3F52304B}" destId="{5EE94A07-DE5A-4F7A-A8DD-16D552E2D98E}" srcOrd="0" destOrd="0" presId="urn:microsoft.com/office/officeart/2005/8/layout/orgChart1"/>
+    <dgm:cxn modelId="{9D5A7CD4-7BE6-4DA0-ADC9-D59AA3A73DD7}" type="presOf" srcId="{B5CEA2D4-A899-4C2C-BA30-79C7F0302244}" destId="{2B0A4C06-23E2-4C10-ACD4-A1381D5956C7}" srcOrd="1" destOrd="0" presId="urn:microsoft.com/office/officeart/2005/8/layout/orgChart1"/>
+    <dgm:cxn modelId="{F67A02AC-85B2-42B8-A820-7DEF1E7361EB}" type="presOf" srcId="{58F003E5-0E8F-43B2-BD78-8704859781FC}" destId="{D94F6F4E-3CAA-4D71-98C2-5B11B32EE224}" srcOrd="0" destOrd="0" presId="urn:microsoft.com/office/officeart/2005/8/layout/orgChart1"/>
+    <dgm:cxn modelId="{ED37DA95-C391-4824-A0AF-8C0144EBA658}" type="presOf" srcId="{37682145-075D-4526-BE74-A2FD14772674}" destId="{3C43E7A2-C899-4FF3-A54E-8B1DADF7F1D8}" srcOrd="0" destOrd="0" presId="urn:microsoft.com/office/officeart/2005/8/layout/orgChart1"/>
+    <dgm:cxn modelId="{932B0F83-2183-4A9C-A62C-C3E3B9024CD5}" type="presOf" srcId="{02E8AF3B-DB86-4F9A-8D46-27D7319E4BB8}" destId="{54823B34-9DA0-498C-B771-985D797ABA89}" srcOrd="1" destOrd="0" presId="urn:microsoft.com/office/officeart/2005/8/layout/orgChart1"/>
+    <dgm:cxn modelId="{FD2626E4-053E-40E0-83E1-7D629CF0B604}" type="presOf" srcId="{B5CEA2D4-A899-4C2C-BA30-79C7F0302244}" destId="{E6677268-D00C-4D1B-A6D9-295F28778097}" srcOrd="0" destOrd="0" presId="urn:microsoft.com/office/officeart/2005/8/layout/orgChart1"/>
+    <dgm:cxn modelId="{06EFAC49-7BD8-4764-9ADD-0827E5679D1A}" type="presOf" srcId="{F841F772-F263-44DB-AF9F-DD29A8A41A82}" destId="{2F56B4D2-400A-48F1-9F86-328A9D96FD6A}" srcOrd="0" destOrd="0" presId="urn:microsoft.com/office/officeart/2005/8/layout/orgChart1"/>
+    <dgm:cxn modelId="{5CAC690D-9F55-4BE9-B588-1627A79DA2EE}" srcId="{2FD0ACBE-A9EE-439B-BDD7-7D04768F5ECB}" destId="{BD1DDD68-A030-4E56-A78C-C045A20D5260}" srcOrd="0" destOrd="0" parTransId="{4AC75C96-6CDF-4654-8237-F7788401C076}" sibTransId="{2A6CE0CF-4746-4229-9777-1B3C17C91DE0}"/>
+    <dgm:cxn modelId="{8483C8D2-1419-4A30-9BD1-5286CA25BFEE}" srcId="{0274927B-4160-4899-AF19-9671AA211A2B}" destId="{02E8AF3B-DB86-4F9A-8D46-27D7319E4BB8}" srcOrd="9" destOrd="0" parTransId="{8017E421-4010-47DD-B3A2-150D7F01784C}" sibTransId="{4CCAA9F6-7FF4-460F-8B35-21E70EA635D7}"/>
+    <dgm:cxn modelId="{FE190A70-81DD-4CD5-A132-B05B37B66F18}" type="presOf" srcId="{04A842A6-3D2B-45FE-B6D1-65F0829EE722}" destId="{03285AB4-389B-4A8E-A739-E4FB594C24BF}" srcOrd="1" destOrd="0" presId="urn:microsoft.com/office/officeart/2005/8/layout/orgChart1"/>
+    <dgm:cxn modelId="{09ACC25B-21B4-4565-AE54-C7F8E83E1CF9}" type="presOf" srcId="{BD1DDD68-A030-4E56-A78C-C045A20D5260}" destId="{BBD8B560-3529-4560-B4F4-2FF262593363}" srcOrd="0" destOrd="0" presId="urn:microsoft.com/office/officeart/2005/8/layout/orgChart1"/>
+    <dgm:cxn modelId="{99306810-C422-4A11-B504-A746C310C603}" srcId="{CF25F756-588F-4C1B-9591-BB613EE272CB}" destId="{0274927B-4160-4899-AF19-9671AA211A2B}" srcOrd="0" destOrd="0" parTransId="{2AED433D-0597-4258-B441-18772D8834FD}" sibTransId="{A88DCB20-EF2C-4111-AE84-9D6560A02F3F}"/>
+    <dgm:cxn modelId="{FD50899F-F26F-4C11-83D7-40684D29EC93}" srcId="{B5CEA2D4-A899-4C2C-BA30-79C7F0302244}" destId="{6D36762B-FB57-4DEA-90CD-3F097F4D25CC}" srcOrd="5" destOrd="0" parTransId="{F3C2A341-069D-4991-8990-61DFFDB62E32}" sibTransId="{AED57AF9-10F1-4CD6-9667-9BB1699AF639}"/>
+    <dgm:cxn modelId="{C008063F-1F1E-4934-8A59-A7B4187AD825}" srcId="{B5CEA2D4-A899-4C2C-BA30-79C7F0302244}" destId="{206FA317-2A95-4AFD-B801-ED2E3F52304B}" srcOrd="2" destOrd="0" parTransId="{463DAE48-7CE6-4E11-AAB1-77194570CA13}" sibTransId="{D951AF62-7ECE-4764-8F28-FC9C836D48FD}"/>
+    <dgm:cxn modelId="{D02B7583-95EA-4523-BF77-D4ED19602245}" type="presOf" srcId="{3741E197-C607-4BAC-A29B-066FB2751C91}" destId="{C0E743B2-38B4-4FFD-8B35-ADA7FA1431B1}" srcOrd="1" destOrd="0" presId="urn:microsoft.com/office/officeart/2005/8/layout/orgChart1"/>
+    <dgm:cxn modelId="{F04F67C3-206C-46AA-8ACC-4C99D2CCEE71}" type="presOf" srcId="{A3998B0F-A5C6-48FE-B0BC-BF0B7E2B7081}" destId="{76159509-0BB5-44D0-976C-3983E2A2D266}" srcOrd="0" destOrd="0" presId="urn:microsoft.com/office/officeart/2005/8/layout/orgChart1"/>
+    <dgm:cxn modelId="{22A2DE11-AF36-45BE-9AFC-F21A6B434EA9}" type="presOf" srcId="{CF2D02B9-0D4C-438A-9A09-36265FCD126F}" destId="{D5DB1BF8-7727-41DB-8711-7758CBC1CD9E}" srcOrd="1" destOrd="0" presId="urn:microsoft.com/office/officeart/2005/8/layout/orgChart1"/>
+    <dgm:cxn modelId="{A62D367F-D6F1-45C9-948B-633035A87407}" type="presOf" srcId="{1E3ABECC-8D21-4FCF-8F22-4047954C6620}" destId="{D27660A4-8C22-4AA8-8F93-D6A250C1942F}" srcOrd="1" destOrd="0" presId="urn:microsoft.com/office/officeart/2005/8/layout/orgChart1"/>
+    <dgm:cxn modelId="{38EEAE5E-BE61-432A-AD98-11B56DFE10F7}" srcId="{3045B1B2-DC0A-4607-ACC9-6EA0209878F6}" destId="{3F86936B-1FD6-48A0-A250-2B1EB4CB5592}" srcOrd="2" destOrd="0" parTransId="{882C9CBD-8965-4D73-98D7-54F437501BE5}" sibTransId="{D879D27F-8D76-420C-B068-F16896F28251}"/>
+    <dgm:cxn modelId="{E0EDEBE0-ECA5-466F-959E-35BACBB328EA}" type="presOf" srcId="{0514F8A1-4B60-46B1-9B43-60C5F0627DF1}" destId="{6FC30F81-EB7F-4DFC-9AA5-C2A37B459F04}" srcOrd="1" destOrd="0" presId="urn:microsoft.com/office/officeart/2005/8/layout/orgChart1"/>
+    <dgm:cxn modelId="{C756083A-26FF-4525-8C0F-23D1A569FB42}" type="presOf" srcId="{5C8EBEB2-45CA-4875-B2C1-3A80FFD2AC67}" destId="{08D8DD80-F8DB-42D4-8B5F-8F3E6B33839A}" srcOrd="1" destOrd="0" presId="urn:microsoft.com/office/officeart/2005/8/layout/orgChart1"/>
+    <dgm:cxn modelId="{3BF74CAC-D601-4BF8-8652-4C0AEED10D8B}" type="presOf" srcId="{13F23037-5BD1-4678-8671-2EBB7A37F8AB}" destId="{4E5E3395-7D78-4F0F-8BA4-0CA66D4382A3}" srcOrd="0" destOrd="0" presId="urn:microsoft.com/office/officeart/2005/8/layout/orgChart1"/>
+    <dgm:cxn modelId="{50C39D5E-B2DD-4EA9-8E77-53C6403BC397}" srcId="{0274927B-4160-4899-AF19-9671AA211A2B}" destId="{A7E6D440-D1BC-47AB-A4BC-6364938D11FE}" srcOrd="5" destOrd="0" parTransId="{5320F88E-D563-4578-9D4B-CD929B72BF81}" sibTransId="{A0C8DCC6-70B8-48E5-B8E0-C03E56731BB9}"/>
+    <dgm:cxn modelId="{59FFE1AD-8C0D-40B1-A691-61008CC1ABAD}" type="presOf" srcId="{70C0C7BE-A049-472C-960B-F3918754FB25}" destId="{0A62653C-0DF8-4EDF-A01B-23209F9F26F9}" srcOrd="0" destOrd="0" presId="urn:microsoft.com/office/officeart/2005/8/layout/orgChart1"/>
+    <dgm:cxn modelId="{721B8B6A-B60A-4FC9-B228-A79D3958DB03}" srcId="{3045B1B2-DC0A-4607-ACC9-6EA0209878F6}" destId="{0C48992A-DA9E-416D-B351-F6CF3917497B}" srcOrd="1" destOrd="0" parTransId="{7C6E53BB-7621-4B9E-B8AB-2A5789109803}" sibTransId="{BEFB7897-8604-43A3-978F-CBD7C072936F}"/>
+    <dgm:cxn modelId="{F5F9489E-835D-4874-BC85-C67A39A7B164}" type="presOf" srcId="{02E8AF3B-DB86-4F9A-8D46-27D7319E4BB8}" destId="{0A9A1E76-FE42-4D99-8E38-8C153C3BEC71}" srcOrd="0" destOrd="0" presId="urn:microsoft.com/office/officeart/2005/8/layout/orgChart1"/>
+    <dgm:cxn modelId="{69670487-BB5E-4DD8-94C1-F8F7AD3FEB48}" type="presOf" srcId="{FC3BE7C2-CAF1-4079-9560-5489769EFC27}" destId="{C33C7A6C-C6C4-41AC-8DE1-8DDEFEB60920}" srcOrd="0" destOrd="0" presId="urn:microsoft.com/office/officeart/2005/8/layout/orgChart1"/>
+    <dgm:cxn modelId="{A55CA500-8650-466E-9D91-4678654A790C}" type="presOf" srcId="{4AC75C96-6CDF-4654-8237-F7788401C076}" destId="{F6AF1D9D-BBE8-4B97-95BF-FA0015EF42D6}" srcOrd="0" destOrd="0" presId="urn:microsoft.com/office/officeart/2005/8/layout/orgChart1"/>
+    <dgm:cxn modelId="{1316D42C-BB88-4516-A132-26B5F40E8F09}" type="presOf" srcId="{C88AE6E3-0700-4F24-88F8-01A94F1EFDD0}" destId="{1D844913-ECD1-4382-9097-101154A0FCC7}" srcOrd="0" destOrd="0" presId="urn:microsoft.com/office/officeart/2005/8/layout/orgChart1"/>
+    <dgm:cxn modelId="{0577416B-B4C3-4654-8F13-8D8E24A33E34}" srcId="{0274927B-4160-4899-AF19-9671AA211A2B}" destId="{2FD0ACBE-A9EE-439B-BDD7-7D04768F5ECB}" srcOrd="7" destOrd="0" parTransId="{115D3D74-8A9E-46A5-8E17-2DD64D5CC212}" sibTransId="{47B2DB87-A5FE-4B74-B4D7-E946093551B1}"/>
     <dgm:cxn modelId="{3B74D457-D5E5-464A-9B4C-5AAFA0FE0E4D}" type="presOf" srcId="{C4DD8EDD-E995-4C25-AFF8-F83A3553FAF9}" destId="{5D30D3E5-3448-4B85-9084-9844DD694E7F}" srcOrd="1" destOrd="0" presId="urn:microsoft.com/office/officeart/2005/8/layout/orgChart1"/>
-    <dgm:cxn modelId="{95E58B78-5D9A-44E6-BB6A-DE511F49FD76}" type="presOf" srcId="{9212E598-9C44-43E3-A9F6-848C3F7B98C6}" destId="{62F83636-57B9-481E-B7D7-8B7EBC51A031}" srcOrd="1" destOrd="0" presId="urn:microsoft.com/office/officeart/2005/8/layout/orgChart1"/>
-    <dgm:cxn modelId="{A55CA500-8650-466E-9D91-4678654A790C}" type="presOf" srcId="{4AC75C96-6CDF-4654-8237-F7788401C076}" destId="{F6AF1D9D-BBE8-4B97-95BF-FA0015EF42D6}" srcOrd="0" destOrd="0" presId="urn:microsoft.com/office/officeart/2005/8/layout/orgChart1"/>
-    <dgm:cxn modelId="{7954354A-A23E-42B6-840A-962221585393}" srcId="{CF25F756-588F-4C1B-9591-BB613EE272CB}" destId="{C4DD8EDD-E995-4C25-AFF8-F83A3553FAF9}" srcOrd="1" destOrd="0" parTransId="{0E88CAD0-4595-4D4B-A0AC-4CD7353C555C}" sibTransId="{A1AE32C3-045C-49F6-8F2E-1508D00C4D8D}"/>
-    <dgm:cxn modelId="{50C39D5E-B2DD-4EA9-8E77-53C6403BC397}" srcId="{0274927B-4160-4899-AF19-9671AA211A2B}" destId="{A7E6D440-D1BC-47AB-A4BC-6364938D11FE}" srcOrd="5" destOrd="0" parTransId="{5320F88E-D563-4578-9D4B-CD929B72BF81}" sibTransId="{A0C8DCC6-70B8-48E5-B8E0-C03E56731BB9}"/>
+    <dgm:cxn modelId="{FF74AEB6-BE94-4976-973A-6E0A34DE17C7}" type="presOf" srcId="{F841F772-F263-44DB-AF9F-DD29A8A41A82}" destId="{EAAC0396-F5F9-4F12-82E3-06CCEE8D8411}" srcOrd="1" destOrd="0" presId="urn:microsoft.com/office/officeart/2005/8/layout/orgChart1"/>
+    <dgm:cxn modelId="{DF45DDA9-300C-4F5A-A0F2-D6B2B1E7E504}" type="presOf" srcId="{F3C2A341-069D-4991-8990-61DFFDB62E32}" destId="{41D8D129-29D8-4385-B786-894926FEDC42}" srcOrd="0" destOrd="0" presId="urn:microsoft.com/office/officeart/2005/8/layout/orgChart1"/>
+    <dgm:cxn modelId="{F32A482D-7F7B-4CCD-B17F-EA205DABBFE8}" type="presOf" srcId="{832D0428-C81C-4895-8335-E8EDA9233ED3}" destId="{E5E7503A-7612-4B0C-A329-AB0202849CA8}" srcOrd="0" destOrd="0" presId="urn:microsoft.com/office/officeart/2005/8/layout/orgChart1"/>
+    <dgm:cxn modelId="{AC44827D-0558-4A31-BD84-2E51D9DAD5C3}" type="presOf" srcId="{0274927B-4160-4899-AF19-9671AA211A2B}" destId="{AE5434BE-0902-49D1-B577-6595F8254C60}" srcOrd="1" destOrd="0" presId="urn:microsoft.com/office/officeart/2005/8/layout/orgChart1"/>
+    <dgm:cxn modelId="{5DD888A8-527C-44F9-8AF5-0DA12C5405D5}" type="presOf" srcId="{E51BC5A4-9C0D-4258-B89D-D0AE1ABE08D8}" destId="{50B91C8F-9633-4F9D-970A-524716897861}" srcOrd="0" destOrd="0" presId="urn:microsoft.com/office/officeart/2005/8/layout/orgChart1"/>
+    <dgm:cxn modelId="{7589C0EA-F1D2-480F-B5E5-C964736EEE91}" srcId="{0274927B-4160-4899-AF19-9671AA211A2B}" destId="{54F52B91-96F3-4A93-8C51-4A8BFBEDFA33}" srcOrd="3" destOrd="0" parTransId="{1B000D60-51F0-4F7C-BE26-B6213BFA4932}" sibTransId="{336023B5-0FCD-49A8-BFE0-A6F3DC26439F}"/>
     <dgm:cxn modelId="{A92AED82-B338-4631-8770-173ADFA5350D}" type="presOf" srcId="{3045B1B2-DC0A-4607-ACC9-6EA0209878F6}" destId="{A3596C5C-D5BF-4D1F-99EE-77880EC19FC8}" srcOrd="0" destOrd="0" presId="urn:microsoft.com/office/officeart/2005/8/layout/orgChart1"/>
+    <dgm:cxn modelId="{6599F7E2-3E16-4051-8CA2-C2423E791985}" srcId="{B5CEA2D4-A899-4C2C-BA30-79C7F0302244}" destId="{04A842A6-3D2B-45FE-B6D1-65F0829EE722}" srcOrd="3" destOrd="0" parTransId="{F6903CF6-6A4F-4541-A359-24FE5D01E33B}" sibTransId="{B14EF6FE-A1CE-4C76-A341-23F4013BAF2C}"/>
     <dgm:cxn modelId="{DCDE5DE1-6C54-49B6-829A-7D27B87A3D18}" srcId="{402192EA-635B-4E5A-BC30-CBA091CCA687}" destId="{0514F8A1-4B60-46B1-9B43-60C5F0627DF1}" srcOrd="0" destOrd="0" parTransId="{6558A57C-4982-4A47-B2B2-8AABE7345991}" sibTransId="{5B3A3CB9-257B-4EAE-AA31-FB1004E25F63}"/>
+    <dgm:cxn modelId="{50D354AA-25C4-4669-8671-798B6D692070}" type="presOf" srcId="{1FD30924-7ED0-4217-A609-81C912422B24}" destId="{70DD15F4-9873-4C92-A83A-F5A2BD26FFD0}" srcOrd="1" destOrd="0" presId="urn:microsoft.com/office/officeart/2005/8/layout/orgChart1"/>
+    <dgm:cxn modelId="{32B27E00-4A2B-438E-9358-0D07D4FBEC71}" type="presOf" srcId="{1E3ABECC-8D21-4FCF-8F22-4047954C6620}" destId="{F0432EA2-E586-4C57-9E74-B7DC627F4296}" srcOrd="0" destOrd="0" presId="urn:microsoft.com/office/officeart/2005/8/layout/orgChart1"/>
+    <dgm:cxn modelId="{498AC11B-4E30-41CF-90E0-EFAFC934B926}" type="presOf" srcId="{254F2FB9-B8B1-45E2-A82F-4EBBA8D47F7E}" destId="{AE0DAA20-8A17-469F-A2AE-7E1D1148B1A8}" srcOrd="0" destOrd="0" presId="urn:microsoft.com/office/officeart/2005/8/layout/orgChart1"/>
+    <dgm:cxn modelId="{016013A9-4DB3-4A92-A3FF-346A8DD93180}" srcId="{402192EA-635B-4E5A-BC30-CBA091CCA687}" destId="{412D8D73-F653-4132-AF48-FE332EE4AF61}" srcOrd="2" destOrd="0" parTransId="{0F3850D7-801C-4B55-B4EE-9750549084FF}" sibTransId="{EFC177A6-1831-46A1-945C-32C74CF2CF26}"/>
+    <dgm:cxn modelId="{35A287EA-9491-437B-987D-AD9059A4EAE8}" type="presOf" srcId="{FDC9F48B-2A97-42BB-A94D-14DD284B616A}" destId="{96A2D62A-7231-40B0-A064-11231D9FBD36}" srcOrd="0" destOrd="0" presId="urn:microsoft.com/office/officeart/2005/8/layout/orgChart1"/>
+    <dgm:cxn modelId="{1AB163AD-36C3-47C8-A3E4-8FC509D1385C}" type="presOf" srcId="{04A842A6-3D2B-45FE-B6D1-65F0829EE722}" destId="{641A9226-B231-4E8E-9C55-F68651D94D4E}" srcOrd="0" destOrd="0" presId="urn:microsoft.com/office/officeart/2005/8/layout/orgChart1"/>
+    <dgm:cxn modelId="{E5F2F7F3-DE38-4F3B-9FD9-E04636928AB0}" srcId="{0274927B-4160-4899-AF19-9671AA211A2B}" destId="{C88AE6E3-0700-4F24-88F8-01A94F1EFDD0}" srcOrd="2" destOrd="0" parTransId="{F7A70203-5488-40A0-9132-52AF0CCC0865}" sibTransId="{78980ABB-0FED-49B9-BE6C-FAFA6324EC58}"/>
     <dgm:cxn modelId="{7E4816DA-8326-4A0B-838B-C3781308556D}" type="presOf" srcId="{6667787B-8278-48F1-A8AA-4BBEBED29AC7}" destId="{24DB76FC-FDBB-4AED-BE5A-4E4AE56E9F1D}" srcOrd="0" destOrd="0" presId="urn:microsoft.com/office/officeart/2005/8/layout/orgChart1"/>
-    <dgm:cxn modelId="{A3621D76-B265-4375-A938-10D0C0A42B63}" type="presOf" srcId="{6D36762B-FB57-4DEA-90CD-3F097F4D25CC}" destId="{92C0FB43-53F4-4321-BEF9-66199300F0E8}" srcOrd="0" destOrd="0" presId="urn:microsoft.com/office/officeart/2005/8/layout/orgChart1"/>
-    <dgm:cxn modelId="{932B0F83-2183-4A9C-A62C-C3E3B9024CD5}" type="presOf" srcId="{02E8AF3B-DB86-4F9A-8D46-27D7319E4BB8}" destId="{54823B34-9DA0-498C-B771-985D797ABA89}" srcOrd="1" destOrd="0" presId="urn:microsoft.com/office/officeart/2005/8/layout/orgChart1"/>
-    <dgm:cxn modelId="{3BF74CAC-D601-4BF8-8652-4C0AEED10D8B}" type="presOf" srcId="{13F23037-5BD1-4678-8671-2EBB7A37F8AB}" destId="{4E5E3395-7D78-4F0F-8BA4-0CA66D4382A3}" srcOrd="0" destOrd="0" presId="urn:microsoft.com/office/officeart/2005/8/layout/orgChart1"/>
-    <dgm:cxn modelId="{C1C74712-BFAD-46F4-9825-14DF62A02B66}" type="presOf" srcId="{1707DDAA-FF7D-469D-B0BB-E186BF94AAE6}" destId="{9C2D6E1B-1D6A-40AE-936F-284B7321FF42}" srcOrd="0" destOrd="0" presId="urn:microsoft.com/office/officeart/2005/8/layout/orgChart1"/>
-    <dgm:cxn modelId="{ADEF9F17-174F-4038-BCB4-AB1A61B400DD}" type="presOf" srcId="{37682145-075D-4526-BE74-A2FD14772674}" destId="{F2328742-AD42-44F6-93EE-FB64E22017C9}" srcOrd="1" destOrd="0" presId="urn:microsoft.com/office/officeart/2005/8/layout/orgChart1"/>
-    <dgm:cxn modelId="{E0EDEBE0-ECA5-466F-959E-35BACBB328EA}" type="presOf" srcId="{0514F8A1-4B60-46B1-9B43-60C5F0627DF1}" destId="{6FC30F81-EB7F-4DFC-9AA5-C2A37B459F04}" srcOrd="1" destOrd="0" presId="urn:microsoft.com/office/officeart/2005/8/layout/orgChart1"/>
-    <dgm:cxn modelId="{F32A482D-7F7B-4CCD-B17F-EA205DABBFE8}" type="presOf" srcId="{832D0428-C81C-4895-8335-E8EDA9233ED3}" destId="{E5E7503A-7612-4B0C-A329-AB0202849CA8}" srcOrd="0" destOrd="0" presId="urn:microsoft.com/office/officeart/2005/8/layout/orgChart1"/>
-    <dgm:cxn modelId="{5DD888A8-527C-44F9-8AF5-0DA12C5405D5}" type="presOf" srcId="{E51BC5A4-9C0D-4258-B89D-D0AE1ABE08D8}" destId="{50B91C8F-9633-4F9D-970A-524716897861}" srcOrd="0" destOrd="0" presId="urn:microsoft.com/office/officeart/2005/8/layout/orgChart1"/>
-    <dgm:cxn modelId="{3C19EA0D-1E85-4588-BF93-9653EC6E2CFF}" type="presOf" srcId="{99D9C4F3-84D0-4398-BA5C-83FCBD76B890}" destId="{17805C60-C0CE-46BF-BA01-F8C5D9F70B79}" srcOrd="1" destOrd="0" presId="urn:microsoft.com/office/officeart/2005/8/layout/orgChart1"/>
-    <dgm:cxn modelId="{AAA020C6-E2F1-4FCD-97BC-637EFFB70E8B}" srcId="{B5CEA2D4-A899-4C2C-BA30-79C7F0302244}" destId="{A9751E97-5308-409A-BD37-D117ED6BF809}" srcOrd="1" destOrd="0" parTransId="{B76B37EA-7611-4BE2-8A94-945B0806F9F6}" sibTransId="{9222EC89-35DE-4ED9-8619-5ACD4F38A454}"/>
-    <dgm:cxn modelId="{496869C1-252A-47F6-977A-AAD0A5DF36CD}" type="presOf" srcId="{0514F8A1-4B60-46B1-9B43-60C5F0627DF1}" destId="{8A46CCD3-1595-4057-9247-6F1A420CF6FC}" srcOrd="0" destOrd="0" presId="urn:microsoft.com/office/officeart/2005/8/layout/orgChart1"/>
-    <dgm:cxn modelId="{2BAC5D6B-87B8-43A9-AA90-4785C31A5090}" type="presOf" srcId="{FDC9F48B-2A97-42BB-A94D-14DD284B616A}" destId="{604E9955-A4D8-4EF3-AB62-04F2B6924221}" srcOrd="1" destOrd="0" presId="urn:microsoft.com/office/officeart/2005/8/layout/orgChart1"/>
-    <dgm:cxn modelId="{B7676EF7-348B-4418-AB74-58B4DD511791}" type="presOf" srcId="{5C8EBEB2-45CA-4875-B2C1-3A80FFD2AC67}" destId="{37209606-A253-48BC-A588-886B49BABBD1}" srcOrd="0" destOrd="0" presId="urn:microsoft.com/office/officeart/2005/8/layout/orgChart1"/>
-    <dgm:cxn modelId="{CC6C2AB1-69AD-4C55-944B-2488ABAC2C31}" srcId="{54F52B91-96F3-4A93-8C51-4A8BFBEDFA33}" destId="{9212E598-9C44-43E3-A9F6-848C3F7B98C6}" srcOrd="0" destOrd="0" parTransId="{A3998B0F-A5C6-48FE-B0BC-BF0B7E2B7081}" sibTransId="{8F01BDFD-242D-4425-AA2F-94FB37A1DABF}"/>
-    <dgm:cxn modelId="{3A786003-D049-407B-BE7C-6286F6201166}" type="presOf" srcId="{463DAE48-7CE6-4E11-AAB1-77194570CA13}" destId="{613C03D6-7054-4B73-96F2-78EDD8671AF2}" srcOrd="0" destOrd="0" presId="urn:microsoft.com/office/officeart/2005/8/layout/orgChart1"/>
-    <dgm:cxn modelId="{E25F962B-32A8-4DF6-A89E-C6BDBE3B3721}" type="presOf" srcId="{5320F88E-D563-4578-9D4B-CD929B72BF81}" destId="{1F31A3CC-47E9-4C73-8E01-7B95861616D0}" srcOrd="0" destOrd="0" presId="urn:microsoft.com/office/officeart/2005/8/layout/orgChart1"/>
-    <dgm:cxn modelId="{32B05402-4727-4432-8E1C-DF813FE80087}" type="presOf" srcId="{AA3915FE-4491-42CC-A1AF-70CBC148FF59}" destId="{E9FA3E35-E17C-402A-9F06-8A140AF13D6A}" srcOrd="0" destOrd="0" presId="urn:microsoft.com/office/officeart/2005/8/layout/orgChart1"/>
-    <dgm:cxn modelId="{3EE2FB32-DEBE-4EF5-A7AC-DBC5320AAB86}" type="presOf" srcId="{C88AE6E3-0700-4F24-88F8-01A94F1EFDD0}" destId="{20D19837-0E96-49A9-A9CC-3C434CEB5CA5}" srcOrd="1" destOrd="0" presId="urn:microsoft.com/office/officeart/2005/8/layout/orgChart1"/>
-    <dgm:cxn modelId="{68D85CC6-9308-4348-A2D3-267308B44407}" type="presOf" srcId="{832D0428-C81C-4895-8335-E8EDA9233ED3}" destId="{149078CD-1B5B-412D-A0CE-202071623540}" srcOrd="1" destOrd="0" presId="urn:microsoft.com/office/officeart/2005/8/layout/orgChart1"/>
-    <dgm:cxn modelId="{F7ED06D6-5207-47C2-98C5-929CD70B2081}" type="presOf" srcId="{A7E6D440-D1BC-47AB-A4BC-6364938D11FE}" destId="{88E42A67-50A6-46C1-A655-A67481AF8CF9}" srcOrd="0" destOrd="0" presId="urn:microsoft.com/office/officeart/2005/8/layout/orgChart1"/>
-    <dgm:cxn modelId="{D2ABC662-1AF9-4909-B9FD-0244068A5D15}" srcId="{0274927B-4160-4899-AF19-9671AA211A2B}" destId="{FDC9F48B-2A97-42BB-A94D-14DD284B616A}" srcOrd="0" destOrd="0" parTransId="{EF945DD0-6504-45B1-B65D-422FF7CEE416}" sibTransId="{DFBEF7FD-6A4D-43F9-AEF4-4EB26978CE13}"/>
-    <dgm:cxn modelId="{4BDA56F7-0741-4184-A1C9-D3ABAA158281}" type="presOf" srcId="{EB3B4FD7-4B93-4B6A-85DA-411D4E46D809}" destId="{586BD3CC-D024-49AE-98A9-57447680C793}" srcOrd="1" destOrd="0" presId="urn:microsoft.com/office/officeart/2005/8/layout/orgChart1"/>
-    <dgm:cxn modelId="{36BDA124-864F-43FE-B765-FA109A9C0381}" srcId="{3045B1B2-DC0A-4607-ACC9-6EA0209878F6}" destId="{5C8EBEB2-45CA-4875-B2C1-3A80FFD2AC67}" srcOrd="0" destOrd="0" parTransId="{AA3915FE-4491-42CC-A1AF-70CBC148FF59}" sibTransId="{87CF262D-40B1-4CCD-A406-357431074C01}"/>
-    <dgm:cxn modelId="{A1FB16BD-AC41-4AC9-938C-E954F2E19DF7}" type="presOf" srcId="{0F3850D7-801C-4B55-B4EE-9750549084FF}" destId="{08B4D769-2DB8-4026-BE5A-65BB0EFF9F14}" srcOrd="0" destOrd="0" presId="urn:microsoft.com/office/officeart/2005/8/layout/orgChart1"/>
-    <dgm:cxn modelId="{9BBD892C-C3FA-4558-9DFE-DC35A7D75B48}" type="presOf" srcId="{402192EA-635B-4E5A-BC30-CBA091CCA687}" destId="{831B417E-D813-4576-8428-B6F99D5216F6}" srcOrd="1" destOrd="0" presId="urn:microsoft.com/office/officeart/2005/8/layout/orgChart1"/>
-    <dgm:cxn modelId="{522C70D9-2B01-48E7-A639-421F155223C8}" type="presOf" srcId="{1707DDAA-FF7D-469D-B0BB-E186BF94AAE6}" destId="{3596B5AD-F16B-4ED3-96AA-D3FE4FDF760F}" srcOrd="1" destOrd="0" presId="urn:microsoft.com/office/officeart/2005/8/layout/orgChart1"/>
-    <dgm:cxn modelId="{715E57C6-0910-476B-B0D0-7296428EADF8}" type="presOf" srcId="{3045B1B2-DC0A-4607-ACC9-6EA0209878F6}" destId="{B6A114D4-4B75-4F1E-A379-E402CD10E6C4}" srcOrd="1" destOrd="0" presId="urn:microsoft.com/office/officeart/2005/8/layout/orgChart1"/>
-    <dgm:cxn modelId="{1032A209-123D-4C8F-842E-4B40FE90968D}" type="presOf" srcId="{2FD0ACBE-A9EE-439B-BDD7-7D04768F5ECB}" destId="{A135AE1E-C7DE-4D38-BF64-3DB4EBB55480}" srcOrd="1" destOrd="0" presId="urn:microsoft.com/office/officeart/2005/8/layout/orgChart1"/>
-    <dgm:cxn modelId="{D02B7583-95EA-4523-BF77-D4ED19602245}" type="presOf" srcId="{3741E197-C607-4BAC-A29B-066FB2751C91}" destId="{C0E743B2-38B4-4FFD-8B35-ADA7FA1431B1}" srcOrd="1" destOrd="0" presId="urn:microsoft.com/office/officeart/2005/8/layout/orgChart1"/>
-    <dgm:cxn modelId="{38EEAE5E-BE61-432A-AD98-11B56DFE10F7}" srcId="{3045B1B2-DC0A-4607-ACC9-6EA0209878F6}" destId="{3F86936B-1FD6-48A0-A250-2B1EB4CB5592}" srcOrd="2" destOrd="0" parTransId="{882C9CBD-8965-4D73-98D7-54F437501BE5}" sibTransId="{D879D27F-8D76-420C-B068-F16896F28251}"/>
-    <dgm:cxn modelId="{85026290-96D5-4D0F-9075-6ECB10EE9BFA}" srcId="{B5CEA2D4-A899-4C2C-BA30-79C7F0302244}" destId="{49114A9B-D2E0-4713-9DBF-1B7318FD9E27}" srcOrd="4" destOrd="0" parTransId="{9511AE43-BA7F-49B2-BA3B-266CB9B06C28}" sibTransId="{E3FE093F-97A4-4DFF-8A60-A5C2CF1AA222}"/>
-    <dgm:cxn modelId="{09ACC25B-21B4-4565-AE54-C7F8E83E1CF9}" type="presOf" srcId="{BD1DDD68-A030-4E56-A78C-C045A20D5260}" destId="{BBD8B560-3529-4560-B4F4-2FF262593363}" srcOrd="0" destOrd="0" presId="urn:microsoft.com/office/officeart/2005/8/layout/orgChart1"/>
-    <dgm:cxn modelId="{6599F7E2-3E16-4051-8CA2-C2423E791985}" srcId="{B5CEA2D4-A899-4C2C-BA30-79C7F0302244}" destId="{04A842A6-3D2B-45FE-B6D1-65F0829EE722}" srcOrd="3" destOrd="0" parTransId="{F6903CF6-6A4F-4541-A359-24FE5D01E33B}" sibTransId="{B14EF6FE-A1CE-4C76-A341-23F4013BAF2C}"/>
-    <dgm:cxn modelId="{E5F2F7F3-DE38-4F3B-9FD9-E04636928AB0}" srcId="{0274927B-4160-4899-AF19-9671AA211A2B}" destId="{C88AE6E3-0700-4F24-88F8-01A94F1EFDD0}" srcOrd="2" destOrd="0" parTransId="{F7A70203-5488-40A0-9132-52AF0CCC0865}" sibTransId="{78980ABB-0FED-49B9-BE6C-FAFA6324EC58}"/>
-    <dgm:cxn modelId="{AC44827D-0558-4A31-BD84-2E51D9DAD5C3}" type="presOf" srcId="{0274927B-4160-4899-AF19-9671AA211A2B}" destId="{AE5434BE-0902-49D1-B577-6595F8254C60}" srcOrd="1" destOrd="0" presId="urn:microsoft.com/office/officeart/2005/8/layout/orgChart1"/>
-    <dgm:cxn modelId="{419E7F53-7DD8-4D1F-90D9-CDE59C63B3CF}" srcId="{0274927B-4160-4899-AF19-9671AA211A2B}" destId="{832D0428-C81C-4895-8335-E8EDA9233ED3}" srcOrd="1" destOrd="0" parTransId="{E51BC5A4-9C0D-4258-B89D-D0AE1ABE08D8}" sibTransId="{F6B1AA2B-235E-4C17-88CA-E0378EFC754E}"/>
-    <dgm:cxn modelId="{35A287EA-9491-437B-987D-AD9059A4EAE8}" type="presOf" srcId="{FDC9F48B-2A97-42BB-A94D-14DD284B616A}" destId="{96A2D62A-7231-40B0-A064-11231D9FBD36}" srcOrd="0" destOrd="0" presId="urn:microsoft.com/office/officeart/2005/8/layout/orgChart1"/>
-    <dgm:cxn modelId="{A484D727-9DCA-46E6-A296-0B75B0A169A7}" type="presOf" srcId="{DDFB70BB-5443-40C0-B689-C60571A5518C}" destId="{3DBEEB83-7DEB-44CB-AC9D-62897A2D4C10}" srcOrd="1" destOrd="0" presId="urn:microsoft.com/office/officeart/2005/8/layout/orgChart1"/>
-    <dgm:cxn modelId="{1F78DAA5-930D-4A06-9D7C-F711202F05E2}" srcId="{2FD0ACBE-A9EE-439B-BDD7-7D04768F5ECB}" destId="{254F2FB9-B8B1-45E2-A82F-4EBBA8D47F7E}" srcOrd="2" destOrd="0" parTransId="{7EE8E44F-0C3A-4679-96F1-03029899B8F6}" sibTransId="{0F138ECC-36AB-47A5-86BF-E34CB11279B0}"/>
-    <dgm:cxn modelId="{06D06D46-FD79-4889-9656-8271F1A511BE}" type="presOf" srcId="{0C48992A-DA9E-416D-B351-F6CF3917497B}" destId="{B8EF8860-201E-4A47-880F-FE1C62264548}" srcOrd="1" destOrd="0" presId="urn:microsoft.com/office/officeart/2005/8/layout/orgChart1"/>
-    <dgm:cxn modelId="{B920FDA4-A114-4410-B52A-4B8C6F900B9D}" srcId="{54F52B91-96F3-4A93-8C51-4A8BFBEDFA33}" destId="{37682145-075D-4526-BE74-A2FD14772674}" srcOrd="3" destOrd="0" parTransId="{C7416EEA-DB93-48CB-9F21-97C8588E35DD}" sibTransId="{070BD383-E262-4C90-83CA-403E164C32E9}"/>
-    <dgm:cxn modelId="{6ACA8C6C-A003-44D7-8B46-FF5578882501}" type="presOf" srcId="{115D3D74-8A9E-46A5-8E17-2DD64D5CC212}" destId="{6FFED9C4-696B-4ABA-A003-AB2F5D1066AB}" srcOrd="0" destOrd="0" presId="urn:microsoft.com/office/officeart/2005/8/layout/orgChart1"/>
-    <dgm:cxn modelId="{C3EBA6E8-8C2D-4B2D-87D1-1771BBCD0A21}" type="presOf" srcId="{BA44C836-44DF-4853-AFD4-C5FBD868FEDE}" destId="{798AF196-C9E6-4068-8D9C-E6C02EBD0190}" srcOrd="1" destOrd="0" presId="urn:microsoft.com/office/officeart/2005/8/layout/orgChart1"/>
-    <dgm:cxn modelId="{BB40391B-57C1-41E3-882B-65032869AED0}" type="presOf" srcId="{C4DD8EDD-E995-4C25-AFF8-F83A3553FAF9}" destId="{234957EB-CEAB-4D64-9578-75C67240B327}" srcOrd="0" destOrd="0" presId="urn:microsoft.com/office/officeart/2005/8/layout/orgChart1"/>
-    <dgm:cxn modelId="{FF74AEB6-BE94-4976-973A-6E0A34DE17C7}" type="presOf" srcId="{F841F772-F263-44DB-AF9F-DD29A8A41A82}" destId="{EAAC0396-F5F9-4F12-82E3-06CCEE8D8411}" srcOrd="1" destOrd="0" presId="urn:microsoft.com/office/officeart/2005/8/layout/orgChart1"/>
-    <dgm:cxn modelId="{7E4922A3-4F53-4FA0-906A-1FA5D06307FD}" type="presOf" srcId="{9511AE43-BA7F-49B2-BA3B-266CB9B06C28}" destId="{539C9AB9-A71B-47D2-BAFA-A26EF16D35E9}" srcOrd="0" destOrd="0" presId="urn:microsoft.com/office/officeart/2005/8/layout/orgChart1"/>
-    <dgm:cxn modelId="{1316D42C-BB88-4516-A132-26B5F40E8F09}" type="presOf" srcId="{C88AE6E3-0700-4F24-88F8-01A94F1EFDD0}" destId="{1D844913-ECD1-4382-9097-101154A0FCC7}" srcOrd="0" destOrd="0" presId="urn:microsoft.com/office/officeart/2005/8/layout/orgChart1"/>
-    <dgm:cxn modelId="{EF2F0D8B-E84D-4DB1-B83A-84360FCF9F03}" type="presOf" srcId="{A9751E97-5308-409A-BD37-D117ED6BF809}" destId="{4F17F90F-8BD4-4804-A10D-0E0D98F92923}" srcOrd="1" destOrd="0" presId="urn:microsoft.com/office/officeart/2005/8/layout/orgChart1"/>
-    <dgm:cxn modelId="{7F517A2A-0306-48E3-A919-C246FF2DC6B0}" srcId="{B5CEA2D4-A899-4C2C-BA30-79C7F0302244}" destId="{DDFB70BB-5443-40C0-B689-C60571A5518C}" srcOrd="0" destOrd="0" parTransId="{72681D1D-992C-46E4-9A0C-549E18C36AF4}" sibTransId="{462D0B24-89DF-49EA-B7D4-AC77E4A14273}"/>
-    <dgm:cxn modelId="{F5F9489E-835D-4874-BC85-C67A39A7B164}" type="presOf" srcId="{02E8AF3B-DB86-4F9A-8D46-27D7319E4BB8}" destId="{0A9A1E76-FE42-4D99-8E38-8C153C3BEC71}" srcOrd="0" destOrd="0" presId="urn:microsoft.com/office/officeart/2005/8/layout/orgChart1"/>
-    <dgm:cxn modelId="{E8DEFCBC-D8F5-4C50-B869-E4B3A644D307}" type="presOf" srcId="{6D36762B-FB57-4DEA-90CD-3F097F4D25CC}" destId="{D9ED388C-CEBD-4853-9A3E-C27037FF2C56}" srcOrd="1" destOrd="0" presId="urn:microsoft.com/office/officeart/2005/8/layout/orgChart1"/>
-    <dgm:cxn modelId="{5CAC690D-9F55-4BE9-B588-1627A79DA2EE}" srcId="{2FD0ACBE-A9EE-439B-BDD7-7D04768F5ECB}" destId="{BD1DDD68-A030-4E56-A78C-C045A20D5260}" srcOrd="0" destOrd="0" parTransId="{4AC75C96-6CDF-4654-8237-F7788401C076}" sibTransId="{2A6CE0CF-4746-4229-9777-1B3C17C91DE0}"/>
-    <dgm:cxn modelId="{8D25119B-2033-406A-9B33-714A1C4121E9}" type="presOf" srcId="{206FA317-2A95-4AFD-B801-ED2E3F52304B}" destId="{5EE94A07-DE5A-4F7A-A8DD-16D552E2D98E}" srcOrd="0" destOrd="0" presId="urn:microsoft.com/office/officeart/2005/8/layout/orgChart1"/>
-    <dgm:cxn modelId="{7589C0EA-F1D2-480F-B5E5-C964736EEE91}" srcId="{0274927B-4160-4899-AF19-9671AA211A2B}" destId="{54F52B91-96F3-4A93-8C51-4A8BFBEDFA33}" srcOrd="3" destOrd="0" parTransId="{1B000D60-51F0-4F7C-BE26-B6213BFA4932}" sibTransId="{336023B5-0FCD-49A8-BFE0-A6F3DC26439F}"/>
     <dgm:cxn modelId="{000FF8F1-A4F6-45DA-BBA1-6822A60C3AE1}" type="presParOf" srcId="{DB6D70D1-1334-4D38-846C-FFDB7A9BF7E5}" destId="{9414EEE7-8A55-4F1D-B7B2-55144D1993C0}" srcOrd="0" destOrd="0" presId="urn:microsoft.com/office/officeart/2005/8/layout/orgChart1"/>
     <dgm:cxn modelId="{05E32A92-9438-4313-A4FF-FD5FA3D0B8BE}" type="presParOf" srcId="{9414EEE7-8A55-4F1D-B7B2-55144D1993C0}" destId="{E6340D80-BCAD-4D87-A180-8BD23DDCC608}" srcOrd="0" destOrd="0" presId="urn:microsoft.com/office/officeart/2005/8/layout/orgChart1"/>
     <dgm:cxn modelId="{37597278-6E90-46ED-8FE6-80601DB9365E}" type="presParOf" srcId="{E6340D80-BCAD-4D87-A180-8BD23DDCC608}" destId="{25FA3ADB-37ED-43D8-B4C9-DE7BAE16907E}" srcOrd="0" destOrd="0" presId="urn:microsoft.com/office/officeart/2005/8/layout/orgChart1"/>
@@ -16747,14 +16747,6 @@
           <a:bodyPr/>
           <a:lstStyle/>
           <a:p>
-            <a:r>
-              <a:rPr lang="en-US" dirty="0" smtClean="0"/>
-              <a:t>The last bubble “Placeholder for Volunteer Use Cases” is only used in this diagram to indicate some</a:t>
-            </a:r>
-            <a:r>
-              <a:rPr lang="en-US" baseline="0" dirty="0" smtClean="0"/>
-              <a:t> use cases from the Volunteer actor.</a:t>
-            </a:r>
             <a:endParaRPr lang="en-US" dirty="0"/>
           </a:p>
         </p:txBody>
@@ -16841,47 +16833,11 @@
           <a:p>
             <a:r>
               <a:rPr lang="en-US" dirty="0" smtClean="0"/>
-              <a:t>This </a:t>
-            </a:r>
-            <a:r>
-              <a:rPr lang="en-US" dirty="0" smtClean="0"/>
-              <a:t>Friends Chapter</a:t>
+              <a:t>This Friends Chapter</a:t>
             </a:r>
             <a:r>
               <a:rPr lang="en-US" baseline="0" dirty="0" smtClean="0"/>
-              <a:t> </a:t>
-            </a:r>
-            <a:r>
-              <a:rPr lang="en-US" baseline="0" dirty="0" smtClean="0"/>
-              <a:t>Volunteer workflow describes the existing Friends </a:t>
-            </a:r>
-            <a:r>
-              <a:rPr lang="en-US" baseline="0" dirty="0" smtClean="0"/>
-              <a:t>Volunteer Hours </a:t>
-            </a:r>
-            <a:r>
-              <a:rPr lang="en-US" baseline="0" dirty="0" smtClean="0"/>
-              <a:t>Log process.  The next iteration of the website will use similar workflow for the Friends Chapter </a:t>
-            </a:r>
-            <a:r>
-              <a:rPr lang="en-US" baseline="0" dirty="0" smtClean="0"/>
-              <a:t>volunteers.  </a:t>
-            </a:r>
-            <a:r>
-              <a:rPr lang="en-US" baseline="0" dirty="0" smtClean="0"/>
-              <a:t>The volunteer page starts with a login, and a member volunteer will still be able to Add New Volunteer Hours, </a:t>
-            </a:r>
-            <a:r>
-              <a:rPr lang="en-US" baseline="0" dirty="0" smtClean="0"/>
-              <a:t>Create/Edit </a:t>
-            </a:r>
-            <a:r>
-              <a:rPr lang="en-US" baseline="0" dirty="0" smtClean="0"/>
-              <a:t>Profile, Update Interests, View </a:t>
-            </a:r>
-            <a:r>
-              <a:rPr lang="en-US" baseline="0" dirty="0" smtClean="0"/>
-              <a:t>Hours, etc.</a:t>
+              <a:t> Volunteer workflow describes the existing Friends Volunteer Hours Log process.  The next iteration of the website will use similar workflow for the Friends Chapter volunteers.  The volunteer page starts with a login, and a member volunteer will still be able to Add New Volunteer Hours, Create/Edit Profile, Update Interests, View Hours, etc.</a:t>
             </a:r>
             <a:endParaRPr lang="en-US" dirty="0"/>
           </a:p>
@@ -17061,19 +17017,7 @@
           <a:p>
             <a:r>
               <a:rPr lang="en-US" dirty="0" smtClean="0"/>
-              <a:t>This data model is based on the </a:t>
-            </a:r>
-            <a:r>
-              <a:rPr lang="en-US" dirty="0" smtClean="0"/>
-              <a:t>user/system </a:t>
-            </a:r>
-            <a:r>
-              <a:rPr lang="en-US" dirty="0" smtClean="0"/>
-              <a:t>requirements.  </a:t>
-            </a:r>
-            <a:r>
-              <a:rPr lang="en-US" dirty="0" smtClean="0"/>
-              <a:t>The admin is also a Friends Chapter member who can update and delete</a:t>
+              <a:t>This data model is based on the user/system requirements.  The admin is also a Friends Chapter member who can update and delete</a:t>
             </a:r>
             <a:r>
               <a:rPr lang="en-US" baseline="0" dirty="0" smtClean="0"/>
@@ -17179,23 +17123,11 @@
           <a:p>
             <a:r>
               <a:rPr lang="en-US" dirty="0" smtClean="0"/>
-              <a:t>This is </a:t>
-            </a:r>
-            <a:r>
-              <a:rPr lang="en-US" dirty="0" smtClean="0"/>
-              <a:t>a</a:t>
+              <a:t>This is a</a:t>
             </a:r>
             <a:r>
               <a:rPr lang="en-US" baseline="0" dirty="0" smtClean="0"/>
-              <a:t> </a:t>
-            </a:r>
-            <a:r>
-              <a:rPr lang="en-US" baseline="0" dirty="0" smtClean="0"/>
-              <a:t>suggested mobile </a:t>
-            </a:r>
-            <a:r>
-              <a:rPr lang="en-US" baseline="0" dirty="0" smtClean="0"/>
-              <a:t>mockup…….</a:t>
+              <a:t> suggested mobile mockup…….</a:t>
             </a:r>
             <a:endParaRPr lang="en-US" dirty="0"/>
           </a:p>
@@ -30489,17 +30421,8 @@
             </a:pPr>
             <a:r>
               <a:rPr lang="en-US" dirty="0" smtClean="0"/>
-              <a:t>Assign </a:t>
+              <a:t>Assign site rebuilding tasks</a:t>
             </a:r>
-            <a:r>
-              <a:rPr lang="en-US" dirty="0" smtClean="0"/>
-              <a:t>site rebuilding </a:t>
-            </a:r>
-            <a:r>
-              <a:rPr lang="en-US" dirty="0" smtClean="0"/>
-              <a:t>tasks</a:t>
-            </a:r>
-            <a:endParaRPr lang="en-US" dirty="0" smtClean="0"/>
           </a:p>
           <a:p>
             <a:pPr>
@@ -30509,11 +30432,7 @@
             </a:pPr>
             <a:r>
               <a:rPr lang="en-US" dirty="0" smtClean="0"/>
-              <a:t>Begin </a:t>
-            </a:r>
-            <a:r>
-              <a:rPr lang="en-US" dirty="0" smtClean="0"/>
-              <a:t>rebuilding website in December</a:t>
+              <a:t>Begin rebuilding website in December</a:t>
             </a:r>
           </a:p>
         </p:txBody>
@@ -30729,8 +30648,62 @@
         </p:blipFill>
         <p:spPr bwMode="auto">
           <a:xfrm>
-            <a:off x="1447800" y="2286000"/>
+            <a:off x="76200" y="2286000"/>
             <a:ext cx="6135097" cy="4495800"/>
+          </a:xfrm>
+          <a:prstGeom prst="rect">
+            <a:avLst/>
+          </a:prstGeom>
+          <a:noFill/>
+          <a:ln>
+            <a:noFill/>
+          </a:ln>
+          <a:extLst>
+            <a:ext uri="{909E8E84-426E-40DD-AFC4-6F175D3DCCD1}">
+              <a14:hiddenFill xmlns:a14="http://schemas.microsoft.com/office/drawing/2010/main">
+                <a:solidFill>
+                  <a:schemeClr val="accent1"/>
+                </a:solidFill>
+              </a14:hiddenFill>
+            </a:ext>
+            <a:ext uri="{91240B29-F687-4F45-9708-019B960494DF}">
+              <a14:hiddenLine xmlns:a14="http://schemas.microsoft.com/office/drawing/2010/main" w="9525">
+                <a:solidFill>
+                  <a:schemeClr val="tx1"/>
+                </a:solidFill>
+                <a:miter lim="800000"/>
+                <a:headEnd/>
+                <a:tailEnd/>
+              </a14:hiddenLine>
+            </a:ext>
+          </a:extLst>
+        </p:spPr>
+      </p:pic>
+      <p:pic>
+        <p:nvPicPr>
+          <p:cNvPr id="1026" name="Picture 2"/>
+          <p:cNvPicPr>
+            <a:picLocks noChangeAspect="1" noChangeArrowheads="1"/>
+          </p:cNvPicPr>
+          <p:nvPr/>
+        </p:nvPicPr>
+        <p:blipFill>
+          <a:blip r:embed="rId3">
+            <a:extLst>
+              <a:ext uri="{28A0092B-C50C-407E-A947-70E740481C1C}">
+                <a14:useLocalDpi xmlns:a14="http://schemas.microsoft.com/office/drawing/2010/main" val="0"/>
+              </a:ext>
+            </a:extLst>
+          </a:blip>
+          <a:srcRect/>
+          <a:stretch>
+            <a:fillRect/>
+          </a:stretch>
+        </p:blipFill>
+        <p:spPr bwMode="auto">
+          <a:xfrm>
+            <a:off x="5975567" y="2286000"/>
+            <a:ext cx="3092233" cy="4495800"/>
           </a:xfrm>
           <a:prstGeom prst="rect">
             <a:avLst/>
@@ -31200,8 +31173,13 @@
             </a:pPr>
             <a:r>
               <a:rPr lang="en-US" dirty="0" smtClean="0"/>
-              <a:t>Attempted to access WP login accounts</a:t>
+              <a:t>Attempted to </a:t>
             </a:r>
+            <a:r>
+              <a:rPr lang="en-US" dirty="0" smtClean="0"/>
+              <a:t>upload malicious files</a:t>
+            </a:r>
+            <a:endParaRPr lang="en-US" dirty="0" smtClean="0"/>
           </a:p>
           <a:p>
             <a:pPr lvl="1">
@@ -31775,6 +31753,26 @@
             </a:pPr>
             <a:r>
               <a:rPr lang="en-US" dirty="0" smtClean="0"/>
+              <a:t>Difficult </a:t>
+            </a:r>
+            <a:r>
+              <a:rPr lang="en-US" smtClean="0"/>
+              <a:t>to update/maintain </a:t>
+            </a:r>
+            <a:r>
+              <a:rPr lang="en-US" dirty="0" smtClean="0"/>
+              <a:t>site and app</a:t>
+            </a:r>
+            <a:endParaRPr lang="en-US" dirty="0" smtClean="0"/>
+          </a:p>
+          <a:p>
+            <a:pPr lvl="1">
+              <a:spcBef>
+                <a:spcPts val="1200"/>
+              </a:spcBef>
+            </a:pPr>
+            <a:r>
+              <a:rPr lang="en-US" dirty="0"/>
               <a:t>Outdated PHP, WP themes and plugins</a:t>
             </a:r>
           </a:p>
@@ -31786,18 +31784,11 @@
             </a:pPr>
             <a:r>
               <a:rPr lang="en-US" dirty="0" smtClean="0"/>
-              <a:t>Difficult Site Navigation</a:t>
+              <a:t>Illogical </a:t>
             </a:r>
-          </a:p>
-          <a:p>
-            <a:pPr lvl="1">
-              <a:spcBef>
-                <a:spcPts val="1200"/>
-              </a:spcBef>
-            </a:pPr>
             <a:r>
               <a:rPr lang="en-US" dirty="0" smtClean="0"/>
-              <a:t>Illogical Menu Structure</a:t>
+              <a:t>Menu Structure</a:t>
             </a:r>
             <a:endParaRPr lang="en-US" dirty="0"/>
           </a:p>
@@ -32064,19 +32055,7 @@
             <a:pPr algn="l"/>
             <a:r>
               <a:rPr lang="en-US" b="1" dirty="0" smtClean="0"/>
-              <a:t>Meet </a:t>
-            </a:r>
-            <a:r>
-              <a:rPr lang="en-US" b="1" dirty="0" smtClean="0"/>
-              <a:t>the</a:t>
-            </a:r>
-            <a:r>
-              <a:rPr lang="en-US" b="1" dirty="0" smtClean="0"/>
-              <a:t> </a:t>
-            </a:r>
-            <a:r>
-              <a:rPr lang="en-US" b="1" dirty="0" smtClean="0"/>
-              <a:t>Team</a:t>
+              <a:t>Meet the Team</a:t>
             </a:r>
             <a:endParaRPr lang="en-US" dirty="0"/>
           </a:p>

</xml_diff>

<commit_message>
Updated SGW Project Update (Final) 29Nov17
Updated project summary and schedule slides
</commit_message>
<xml_diff>
--- a/SGW Project Update (Final) 29Nov17.pptx
+++ b/SGW Project Update (Final) 29Nov17.pptx
@@ -15266,7 +15266,7 @@
           <a:p>
             <a:fld id="{F5E77B19-4C30-44B4-BD0B-CE34772B3C65}" type="datetimeFigureOut">
               <a:rPr lang="en-US" smtClean="0"/>
-              <a:t>11/29/2017</a:t>
+              <a:t>12/8/2017</a:t>
             </a:fld>
             <a:endParaRPr lang="en-US" dirty="0"/>
           </a:p>
@@ -15578,96 +15578,14 @@
           <a:bodyPr/>
           <a:lstStyle/>
           <a:p>
-            <a:pPr>
-              <a:spcBef>
-                <a:spcPts val="0"/>
-              </a:spcBef>
-              <a:spcAft>
-                <a:spcPts val="600"/>
-              </a:spcAft>
-            </a:pPr>
+            <a:r>
+              <a:rPr lang="en-US" b="0" dirty="0" smtClean="0"/>
+              <a:t>wp-config.php – This </a:t>
+            </a:r>
             <a:r>
               <a:rPr lang="en-US" dirty="0" smtClean="0"/>
-              <a:t>October 29, 2017 – unsuccessful attempt</a:t>
+              <a:t>is also one of the highly targeted files by the hackers.</a:t>
             </a:r>
-          </a:p>
-          <a:p>
-            <a:pPr marL="628650" marR="0" lvl="1" indent="-171450" algn="l" defTabSz="914400" rtl="0" eaLnBrk="1" fontAlgn="auto" latinLnBrk="0" hangingPunct="1">
-              <a:lnSpc>
-                <a:spcPct val="100000"/>
-              </a:lnSpc>
-              <a:spcBef>
-                <a:spcPts val="0"/>
-              </a:spcBef>
-              <a:spcAft>
-                <a:spcPts val="600"/>
-              </a:spcAft>
-              <a:buClrTx/>
-              <a:buSzTx/>
-              <a:buFont typeface="Calibri" panose="020F0502020204030204" pitchFamily="34" charset="0"/>
-              <a:buChar char="―"/>
-              <a:tabLst/>
-              <a:defRPr/>
-            </a:pPr>
-            <a:r>
-              <a:rPr lang="en-US" dirty="0" smtClean="0"/>
-              <a:t>Attempted to upload malicious</a:t>
-            </a:r>
-            <a:r>
-              <a:rPr lang="en-US" baseline="0" dirty="0" smtClean="0"/>
-              <a:t> files</a:t>
-            </a:r>
-            <a:endParaRPr lang="en-US" dirty="0" smtClean="0"/>
-          </a:p>
-          <a:p>
-            <a:pPr marL="628650" lvl="1" indent="-171450">
-              <a:spcBef>
-                <a:spcPts val="0"/>
-              </a:spcBef>
-              <a:spcAft>
-                <a:spcPts val="600"/>
-              </a:spcAft>
-              <a:buFont typeface="Calibri" panose="020F0502020204030204" pitchFamily="34" charset="0"/>
-              <a:buChar char="―"/>
-            </a:pPr>
-            <a:r>
-              <a:rPr lang="en-US" dirty="0" smtClean="0"/>
-              <a:t>Also attempted to access WP login accounts</a:t>
-            </a:r>
-          </a:p>
-          <a:p>
-            <a:pPr marL="628650" lvl="1" indent="-171450">
-              <a:spcBef>
-                <a:spcPts val="0"/>
-              </a:spcBef>
-              <a:spcAft>
-                <a:spcPts val="600"/>
-              </a:spcAft>
-              <a:buFont typeface="Calibri" panose="020F0502020204030204" pitchFamily="34" charset="0"/>
-              <a:buChar char="―"/>
-            </a:pPr>
-            <a:r>
-              <a:rPr lang="en-US" dirty="0" smtClean="0"/>
-              <a:t>Ukraine and Netherlands</a:t>
-            </a:r>
-          </a:p>
-          <a:p>
-            <a:pPr marL="628650" lvl="1" indent="-171450">
-              <a:spcBef>
-                <a:spcPts val="0"/>
-              </a:spcBef>
-              <a:spcAft>
-                <a:spcPts val="600"/>
-              </a:spcAft>
-              <a:buFont typeface="Calibri" panose="020F0502020204030204" pitchFamily="34" charset="0"/>
-              <a:buChar char="―"/>
-            </a:pPr>
-            <a:r>
-              <a:rPr lang="en-US" dirty="0" smtClean="0"/>
-              <a:t>Locked three files</a:t>
-            </a:r>
-          </a:p>
-          <a:p>
             <a:endParaRPr lang="en-US" dirty="0"/>
           </a:p>
         </p:txBody>
@@ -15689,7 +15607,7 @@
           <a:p>
             <a:fld id="{EC08C6C5-DD63-4A3D-AD22-7D6D36F6A3FB}" type="slidenum">
               <a:rPr lang="en-US" smtClean="0"/>
-              <a:t>5</a:t>
+              <a:t>3</a:t>
             </a:fld>
             <a:endParaRPr lang="en-US" dirty="0"/>
           </a:p>
@@ -15698,7 +15616,7 @@
     </p:spTree>
     <p:extLst>
       <p:ext uri="{BB962C8B-B14F-4D97-AF65-F5344CB8AC3E}">
-        <p14:creationId xmlns:p14="http://schemas.microsoft.com/office/powerpoint/2010/main" val="923644985"/>
+        <p14:creationId xmlns:p14="http://schemas.microsoft.com/office/powerpoint/2010/main" val="3153675155"/>
       </p:ext>
     </p:extLst>
   </p:cSld>
@@ -15709,6 +15627,204 @@
 </file>
 
 <file path=ppt/notesSlides/notesSlide10.xml><?xml version="1.0" encoding="utf-8"?>
+<p:notes xmlns:a="http://schemas.openxmlformats.org/drawingml/2006/main" xmlns:r="http://schemas.openxmlformats.org/officeDocument/2006/relationships" xmlns:p="http://schemas.openxmlformats.org/presentationml/2006/main">
+  <p:cSld>
+    <p:spTree>
+      <p:nvGrpSpPr>
+        <p:cNvPr id="1" name=""/>
+        <p:cNvGrpSpPr/>
+        <p:nvPr/>
+      </p:nvGrpSpPr>
+      <p:grpSpPr>
+        <a:xfrm>
+          <a:off x="0" y="0"/>
+          <a:ext cx="0" cy="0"/>
+          <a:chOff x="0" y="0"/>
+          <a:chExt cx="0" cy="0"/>
+        </a:xfrm>
+      </p:grpSpPr>
+      <p:sp>
+        <p:nvSpPr>
+          <p:cNvPr id="2" name="Slide Image Placeholder 1"/>
+          <p:cNvSpPr>
+            <a:spLocks noGrp="1" noRot="1" noChangeAspect="1"/>
+          </p:cNvSpPr>
+          <p:nvPr>
+            <p:ph type="sldImg"/>
+          </p:nvPr>
+        </p:nvSpPr>
+        <p:spPr/>
+      </p:sp>
+      <p:sp>
+        <p:nvSpPr>
+          <p:cNvPr id="3" name="Notes Placeholder 2"/>
+          <p:cNvSpPr>
+            <a:spLocks noGrp="1"/>
+          </p:cNvSpPr>
+          <p:nvPr>
+            <p:ph type="body" idx="1"/>
+          </p:nvPr>
+        </p:nvSpPr>
+        <p:spPr/>
+        <p:txBody>
+          <a:bodyPr/>
+          <a:lstStyle/>
+          <a:p>
+            <a:r>
+              <a:rPr lang="en-US" dirty="0" smtClean="0"/>
+              <a:t>This data model is based on the user/system requirements.  The admin is also a Friends Chapter member who can update and delete</a:t>
+            </a:r>
+            <a:r>
+              <a:rPr lang="en-US" baseline="0" dirty="0" smtClean="0"/>
+              <a:t> all</a:t>
+            </a:r>
+            <a:r>
+              <a:rPr lang="en-US" dirty="0" smtClean="0"/>
+              <a:t> members profile.  Also,</a:t>
+            </a:r>
+            <a:r>
+              <a:rPr lang="en-US" baseline="0" dirty="0" smtClean="0"/>
+              <a:t> the admin can create, update, and delete other admin profile.  Therefore, the recursive relationship is used to define the admin-member relationship.</a:t>
+            </a:r>
+          </a:p>
+          <a:p>
+            <a:r>
+              <a:rPr lang="en-US" baseline="0" dirty="0" smtClean="0"/>
+              <a:t>The “projects” table is added here to identify the type of project in which a volunteer participated.</a:t>
+            </a:r>
+            <a:endParaRPr lang="en-US" dirty="0"/>
+          </a:p>
+        </p:txBody>
+      </p:sp>
+      <p:sp>
+        <p:nvSpPr>
+          <p:cNvPr id="4" name="Slide Number Placeholder 3"/>
+          <p:cNvSpPr>
+            <a:spLocks noGrp="1"/>
+          </p:cNvSpPr>
+          <p:nvPr>
+            <p:ph type="sldNum" sz="quarter" idx="10"/>
+          </p:nvPr>
+        </p:nvSpPr>
+        <p:spPr/>
+        <p:txBody>
+          <a:bodyPr/>
+          <a:lstStyle/>
+          <a:p>
+            <a:fld id="{EC08C6C5-DD63-4A3D-AD22-7D6D36F6A3FB}" type="slidenum">
+              <a:rPr lang="en-US" smtClean="0"/>
+              <a:t>16</a:t>
+            </a:fld>
+            <a:endParaRPr lang="en-US" dirty="0"/>
+          </a:p>
+        </p:txBody>
+      </p:sp>
+    </p:spTree>
+    <p:extLst>
+      <p:ext uri="{BB962C8B-B14F-4D97-AF65-F5344CB8AC3E}">
+        <p14:creationId xmlns:p14="http://schemas.microsoft.com/office/powerpoint/2010/main" val="2126180117"/>
+      </p:ext>
+    </p:extLst>
+  </p:cSld>
+  <p:clrMapOvr>
+    <a:masterClrMapping/>
+  </p:clrMapOvr>
+</p:notes>
+</file>
+
+<file path=ppt/notesSlides/notesSlide11.xml><?xml version="1.0" encoding="utf-8"?>
+<p:notes xmlns:a="http://schemas.openxmlformats.org/drawingml/2006/main" xmlns:r="http://schemas.openxmlformats.org/officeDocument/2006/relationships" xmlns:p="http://schemas.openxmlformats.org/presentationml/2006/main">
+  <p:cSld>
+    <p:spTree>
+      <p:nvGrpSpPr>
+        <p:cNvPr id="1" name=""/>
+        <p:cNvGrpSpPr/>
+        <p:nvPr/>
+      </p:nvGrpSpPr>
+      <p:grpSpPr>
+        <a:xfrm>
+          <a:off x="0" y="0"/>
+          <a:ext cx="0" cy="0"/>
+          <a:chOff x="0" y="0"/>
+          <a:chExt cx="0" cy="0"/>
+        </a:xfrm>
+      </p:grpSpPr>
+      <p:sp>
+        <p:nvSpPr>
+          <p:cNvPr id="2" name="Slide Image Placeholder 1"/>
+          <p:cNvSpPr>
+            <a:spLocks noGrp="1" noRot="1" noChangeAspect="1"/>
+          </p:cNvSpPr>
+          <p:nvPr>
+            <p:ph type="sldImg"/>
+          </p:nvPr>
+        </p:nvSpPr>
+        <p:spPr/>
+      </p:sp>
+      <p:sp>
+        <p:nvSpPr>
+          <p:cNvPr id="3" name="Notes Placeholder 2"/>
+          <p:cNvSpPr>
+            <a:spLocks noGrp="1"/>
+          </p:cNvSpPr>
+          <p:nvPr>
+            <p:ph type="body" idx="1"/>
+          </p:nvPr>
+        </p:nvSpPr>
+        <p:spPr/>
+        <p:txBody>
+          <a:bodyPr/>
+          <a:lstStyle/>
+          <a:p>
+            <a:r>
+              <a:rPr lang="en-US" dirty="0" smtClean="0"/>
+              <a:t>This is a</a:t>
+            </a:r>
+            <a:r>
+              <a:rPr lang="en-US" baseline="0" dirty="0" smtClean="0"/>
+              <a:t> suggested mobile mockup…….</a:t>
+            </a:r>
+            <a:endParaRPr lang="en-US" dirty="0"/>
+          </a:p>
+        </p:txBody>
+      </p:sp>
+      <p:sp>
+        <p:nvSpPr>
+          <p:cNvPr id="4" name="Slide Number Placeholder 3"/>
+          <p:cNvSpPr>
+            <a:spLocks noGrp="1"/>
+          </p:cNvSpPr>
+          <p:nvPr>
+            <p:ph type="sldNum" sz="quarter" idx="10"/>
+          </p:nvPr>
+        </p:nvSpPr>
+        <p:spPr/>
+        <p:txBody>
+          <a:bodyPr/>
+          <a:lstStyle/>
+          <a:p>
+            <a:fld id="{EC08C6C5-DD63-4A3D-AD22-7D6D36F6A3FB}" type="slidenum">
+              <a:rPr lang="en-US" smtClean="0"/>
+              <a:t>17</a:t>
+            </a:fld>
+            <a:endParaRPr lang="en-US" dirty="0"/>
+          </a:p>
+        </p:txBody>
+      </p:sp>
+    </p:spTree>
+    <p:extLst>
+      <p:ext uri="{BB962C8B-B14F-4D97-AF65-F5344CB8AC3E}">
+        <p14:creationId xmlns:p14="http://schemas.microsoft.com/office/powerpoint/2010/main" val="2140901243"/>
+      </p:ext>
+    </p:extLst>
+  </p:cSld>
+  <p:clrMapOvr>
+    <a:masterClrMapping/>
+  </p:clrMapOvr>
+</p:notes>
+</file>
+
+<file path=ppt/notesSlides/notesSlide12.xml><?xml version="1.0" encoding="utf-8"?>
 <p:notes xmlns:a="http://schemas.openxmlformats.org/drawingml/2006/main" xmlns:r="http://schemas.openxmlformats.org/officeDocument/2006/relationships" xmlns:p="http://schemas.openxmlformats.org/presentationml/2006/main">
   <p:cSld>
     <p:spTree>
@@ -16160,7 +16276,7 @@
 </p:notes>
 </file>
 
-<file path=ppt/notesSlides/notesSlide11.xml><?xml version="1.0" encoding="utf-8"?>
+<file path=ppt/notesSlides/notesSlide13.xml><?xml version="1.0" encoding="utf-8"?>
 <p:notes xmlns:a="http://schemas.openxmlformats.org/drawingml/2006/main" xmlns:r="http://schemas.openxmlformats.org/officeDocument/2006/relationships" xmlns:p="http://schemas.openxmlformats.org/presentationml/2006/main">
   <p:cSld>
     <p:spTree>
@@ -16340,6 +16456,312 @@
           <a:bodyPr/>
           <a:lstStyle/>
           <a:p>
+            <a:pPr>
+              <a:spcBef>
+                <a:spcPts val="0"/>
+              </a:spcBef>
+              <a:spcAft>
+                <a:spcPts val="600"/>
+              </a:spcAft>
+            </a:pPr>
+            <a:r>
+              <a:rPr lang="en-US" dirty="0" smtClean="0"/>
+              <a:t>October 29, 2017 – unsuccessful attempt</a:t>
+            </a:r>
+          </a:p>
+          <a:p>
+            <a:pPr marL="628650" marR="0" lvl="1" indent="-171450" algn="l" defTabSz="914400" rtl="0" eaLnBrk="1" fontAlgn="auto" latinLnBrk="0" hangingPunct="1">
+              <a:lnSpc>
+                <a:spcPct val="100000"/>
+              </a:lnSpc>
+              <a:spcBef>
+                <a:spcPts val="0"/>
+              </a:spcBef>
+              <a:spcAft>
+                <a:spcPts val="600"/>
+              </a:spcAft>
+              <a:buClrTx/>
+              <a:buSzTx/>
+              <a:buFont typeface="Calibri" panose="020F0502020204030204" pitchFamily="34" charset="0"/>
+              <a:buChar char="―"/>
+              <a:tabLst/>
+              <a:defRPr/>
+            </a:pPr>
+            <a:r>
+              <a:rPr lang="en-US" dirty="0" smtClean="0"/>
+              <a:t>Attempted to upload malicious</a:t>
+            </a:r>
+            <a:r>
+              <a:rPr lang="en-US" baseline="0" dirty="0" smtClean="0"/>
+              <a:t> files</a:t>
+            </a:r>
+            <a:endParaRPr lang="en-US" dirty="0" smtClean="0"/>
+          </a:p>
+          <a:p>
+            <a:pPr marL="628650" lvl="1" indent="-171450">
+              <a:spcBef>
+                <a:spcPts val="0"/>
+              </a:spcBef>
+              <a:spcAft>
+                <a:spcPts val="600"/>
+              </a:spcAft>
+              <a:buFont typeface="Calibri" panose="020F0502020204030204" pitchFamily="34" charset="0"/>
+              <a:buChar char="―"/>
+            </a:pPr>
+            <a:r>
+              <a:rPr lang="en-US" dirty="0" smtClean="0"/>
+              <a:t>Also attempted to access WP login accounts</a:t>
+            </a:r>
+          </a:p>
+          <a:p>
+            <a:pPr marL="628650" lvl="1" indent="-171450">
+              <a:spcBef>
+                <a:spcPts val="0"/>
+              </a:spcBef>
+              <a:spcAft>
+                <a:spcPts val="600"/>
+              </a:spcAft>
+              <a:buFont typeface="Calibri" panose="020F0502020204030204" pitchFamily="34" charset="0"/>
+              <a:buChar char="―"/>
+            </a:pPr>
+            <a:r>
+              <a:rPr lang="en-US" dirty="0" smtClean="0"/>
+              <a:t>Ukraine and Netherlands</a:t>
+            </a:r>
+          </a:p>
+          <a:p>
+            <a:pPr marL="628650" lvl="1" indent="-171450">
+              <a:spcBef>
+                <a:spcPts val="0"/>
+              </a:spcBef>
+              <a:spcAft>
+                <a:spcPts val="600"/>
+              </a:spcAft>
+              <a:buFont typeface="Calibri" panose="020F0502020204030204" pitchFamily="34" charset="0"/>
+              <a:buChar char="―"/>
+            </a:pPr>
+            <a:r>
+              <a:rPr lang="en-US" dirty="0" smtClean="0"/>
+              <a:t>Site</a:t>
+            </a:r>
+            <a:r>
+              <a:rPr lang="en-US" baseline="0" dirty="0" smtClean="0"/>
+              <a:t> host 1and1.com was able to l</a:t>
+            </a:r>
+            <a:r>
+              <a:rPr lang="en-US" dirty="0" smtClean="0"/>
+              <a:t>ock these three files which prevented the hacking</a:t>
+            </a:r>
+            <a:r>
+              <a:rPr lang="en-US" baseline="0" dirty="0" smtClean="0"/>
+              <a:t> attempt.</a:t>
+            </a:r>
+            <a:endParaRPr lang="en-US" dirty="0" smtClean="0"/>
+          </a:p>
+          <a:p>
+            <a:endParaRPr lang="en-US" dirty="0"/>
+          </a:p>
+        </p:txBody>
+      </p:sp>
+      <p:sp>
+        <p:nvSpPr>
+          <p:cNvPr id="4" name="Slide Number Placeholder 3"/>
+          <p:cNvSpPr>
+            <a:spLocks noGrp="1"/>
+          </p:cNvSpPr>
+          <p:nvPr>
+            <p:ph type="sldNum" sz="quarter" idx="10"/>
+          </p:nvPr>
+        </p:nvSpPr>
+        <p:spPr/>
+        <p:txBody>
+          <a:bodyPr/>
+          <a:lstStyle/>
+          <a:p>
+            <a:fld id="{EC08C6C5-DD63-4A3D-AD22-7D6D36F6A3FB}" type="slidenum">
+              <a:rPr lang="en-US" smtClean="0"/>
+              <a:t>5</a:t>
+            </a:fld>
+            <a:endParaRPr lang="en-US" dirty="0"/>
+          </a:p>
+        </p:txBody>
+      </p:sp>
+    </p:spTree>
+    <p:extLst>
+      <p:ext uri="{BB962C8B-B14F-4D97-AF65-F5344CB8AC3E}">
+        <p14:creationId xmlns:p14="http://schemas.microsoft.com/office/powerpoint/2010/main" val="923644985"/>
+      </p:ext>
+    </p:extLst>
+  </p:cSld>
+  <p:clrMapOvr>
+    <a:masterClrMapping/>
+  </p:clrMapOvr>
+</p:notes>
+</file>
+
+<file path=ppt/notesSlides/notesSlide3.xml><?xml version="1.0" encoding="utf-8"?>
+<p:notes xmlns:a="http://schemas.openxmlformats.org/drawingml/2006/main" xmlns:r="http://schemas.openxmlformats.org/officeDocument/2006/relationships" xmlns:p="http://schemas.openxmlformats.org/presentationml/2006/main">
+  <p:cSld>
+    <p:spTree>
+      <p:nvGrpSpPr>
+        <p:cNvPr id="1" name=""/>
+        <p:cNvGrpSpPr/>
+        <p:nvPr/>
+      </p:nvGrpSpPr>
+      <p:grpSpPr>
+        <a:xfrm>
+          <a:off x="0" y="0"/>
+          <a:ext cx="0" cy="0"/>
+          <a:chOff x="0" y="0"/>
+          <a:chExt cx="0" cy="0"/>
+        </a:xfrm>
+      </p:grpSpPr>
+      <p:sp>
+        <p:nvSpPr>
+          <p:cNvPr id="2" name="Slide Image Placeholder 1"/>
+          <p:cNvSpPr>
+            <a:spLocks noGrp="1" noRot="1" noChangeAspect="1"/>
+          </p:cNvSpPr>
+          <p:nvPr>
+            <p:ph type="sldImg"/>
+          </p:nvPr>
+        </p:nvSpPr>
+        <p:spPr/>
+      </p:sp>
+      <p:sp>
+        <p:nvSpPr>
+          <p:cNvPr id="3" name="Notes Placeholder 2"/>
+          <p:cNvSpPr>
+            <a:spLocks noGrp="1"/>
+          </p:cNvSpPr>
+          <p:nvPr>
+            <p:ph type="body" idx="1"/>
+          </p:nvPr>
+        </p:nvSpPr>
+        <p:spPr/>
+        <p:txBody>
+          <a:bodyPr/>
+          <a:lstStyle/>
+          <a:p>
+            <a:r>
+              <a:rPr lang="en-US" b="1" dirty="0" smtClean="0"/>
+              <a:t>Criteria</a:t>
+            </a:r>
+            <a:r>
+              <a:rPr lang="en-US" b="1" baseline="0" dirty="0" smtClean="0"/>
+              <a:t> for website hosting:</a:t>
+            </a:r>
+          </a:p>
+          <a:p>
+            <a:pPr marL="228600" indent="-228600">
+              <a:buAutoNum type="arabicPeriod"/>
+            </a:pPr>
+            <a:r>
+              <a:rPr lang="en-US" baseline="0" dirty="0" smtClean="0"/>
+              <a:t>Code must be accessible and portable</a:t>
+            </a:r>
+          </a:p>
+          <a:p>
+            <a:pPr marL="228600" indent="-228600">
+              <a:buAutoNum type="arabicPeriod"/>
+            </a:pPr>
+            <a:r>
+              <a:rPr lang="en-US" baseline="0" dirty="0" smtClean="0"/>
+              <a:t>Cost must be below $20</a:t>
+            </a:r>
+          </a:p>
+          <a:p>
+            <a:pPr marL="228600" indent="-228600">
+              <a:buAutoNum type="arabicPeriod"/>
+            </a:pPr>
+            <a:r>
+              <a:rPr lang="en-US" baseline="0" dirty="0" smtClean="0"/>
+              <a:t>Site security must be include SiteLock and SSL Certificate</a:t>
+            </a:r>
+            <a:endParaRPr lang="en-US" dirty="0"/>
+          </a:p>
+        </p:txBody>
+      </p:sp>
+      <p:sp>
+        <p:nvSpPr>
+          <p:cNvPr id="4" name="Slide Number Placeholder 3"/>
+          <p:cNvSpPr>
+            <a:spLocks noGrp="1"/>
+          </p:cNvSpPr>
+          <p:nvPr>
+            <p:ph type="sldNum" sz="quarter" idx="10"/>
+          </p:nvPr>
+        </p:nvSpPr>
+        <p:spPr/>
+        <p:txBody>
+          <a:bodyPr/>
+          <a:lstStyle/>
+          <a:p>
+            <a:fld id="{EC08C6C5-DD63-4A3D-AD22-7D6D36F6A3FB}" type="slidenum">
+              <a:rPr lang="en-US" smtClean="0"/>
+              <a:t>7</a:t>
+            </a:fld>
+            <a:endParaRPr lang="en-US" dirty="0"/>
+          </a:p>
+        </p:txBody>
+      </p:sp>
+    </p:spTree>
+    <p:extLst>
+      <p:ext uri="{BB962C8B-B14F-4D97-AF65-F5344CB8AC3E}">
+        <p14:creationId xmlns:p14="http://schemas.microsoft.com/office/powerpoint/2010/main" val="2893868716"/>
+      </p:ext>
+    </p:extLst>
+  </p:cSld>
+  <p:clrMapOvr>
+    <a:masterClrMapping/>
+  </p:clrMapOvr>
+</p:notes>
+</file>
+
+<file path=ppt/notesSlides/notesSlide4.xml><?xml version="1.0" encoding="utf-8"?>
+<p:notes xmlns:a="http://schemas.openxmlformats.org/drawingml/2006/main" xmlns:r="http://schemas.openxmlformats.org/officeDocument/2006/relationships" xmlns:p="http://schemas.openxmlformats.org/presentationml/2006/main">
+  <p:cSld>
+    <p:spTree>
+      <p:nvGrpSpPr>
+        <p:cNvPr id="1" name=""/>
+        <p:cNvGrpSpPr/>
+        <p:nvPr/>
+      </p:nvGrpSpPr>
+      <p:grpSpPr>
+        <a:xfrm>
+          <a:off x="0" y="0"/>
+          <a:ext cx="0" cy="0"/>
+          <a:chOff x="0" y="0"/>
+          <a:chExt cx="0" cy="0"/>
+        </a:xfrm>
+      </p:grpSpPr>
+      <p:sp>
+        <p:nvSpPr>
+          <p:cNvPr id="2" name="Slide Image Placeholder 1"/>
+          <p:cNvSpPr>
+            <a:spLocks noGrp="1" noRot="1" noChangeAspect="1"/>
+          </p:cNvSpPr>
+          <p:nvPr>
+            <p:ph type="sldImg"/>
+          </p:nvPr>
+        </p:nvSpPr>
+        <p:spPr/>
+      </p:sp>
+      <p:sp>
+        <p:nvSpPr>
+          <p:cNvPr id="3" name="Notes Placeholder 2"/>
+          <p:cNvSpPr>
+            <a:spLocks noGrp="1"/>
+          </p:cNvSpPr>
+          <p:nvPr>
+            <p:ph type="body" idx="1"/>
+          </p:nvPr>
+        </p:nvSpPr>
+        <p:spPr/>
+        <p:txBody>
+          <a:bodyPr/>
+          <a:lstStyle/>
+          <a:p>
             <a:endParaRPr lang="en-US" dirty="0"/>
           </a:p>
         </p:txBody>
@@ -16380,7 +16802,7 @@
 </p:notes>
 </file>
 
-<file path=ppt/notesSlides/notesSlide3.xml><?xml version="1.0" encoding="utf-8"?>
+<file path=ppt/notesSlides/notesSlide5.xml><?xml version="1.0" encoding="utf-8"?>
 <p:notes xmlns:a="http://schemas.openxmlformats.org/drawingml/2006/main" xmlns:r="http://schemas.openxmlformats.org/officeDocument/2006/relationships" xmlns:p="http://schemas.openxmlformats.org/presentationml/2006/main">
   <p:cSld>
     <p:spTree>
@@ -16603,7 +17025,7 @@
 </p:notes>
 </file>
 
-<file path=ppt/notesSlides/notesSlide4.xml><?xml version="1.0" encoding="utf-8"?>
+<file path=ppt/notesSlides/notesSlide6.xml><?xml version="1.0" encoding="utf-8"?>
 <p:notes xmlns:a="http://schemas.openxmlformats.org/drawingml/2006/main" xmlns:r="http://schemas.openxmlformats.org/officeDocument/2006/relationships" xmlns:p="http://schemas.openxmlformats.org/presentationml/2006/main">
   <p:cSld>
     <p:spTree>
@@ -16695,7 +17117,7 @@
 </p:notes>
 </file>
 
-<file path=ppt/notesSlides/notesSlide5.xml><?xml version="1.0" encoding="utf-8"?>
+<file path=ppt/notesSlides/notesSlide7.xml><?xml version="1.0" encoding="utf-8"?>
 <p:notes xmlns:a="http://schemas.openxmlformats.org/drawingml/2006/main" xmlns:r="http://schemas.openxmlformats.org/officeDocument/2006/relationships" xmlns:p="http://schemas.openxmlformats.org/presentationml/2006/main">
   <p:cSld>
     <p:spTree>
@@ -16779,7 +17201,7 @@
 </p:notes>
 </file>
 
-<file path=ppt/notesSlides/notesSlide6.xml><?xml version="1.0" encoding="utf-8"?>
+<file path=ppt/notesSlides/notesSlide8.xml><?xml version="1.0" encoding="utf-8"?>
 <p:notes xmlns:a="http://schemas.openxmlformats.org/drawingml/2006/main" xmlns:r="http://schemas.openxmlformats.org/officeDocument/2006/relationships" xmlns:p="http://schemas.openxmlformats.org/presentationml/2006/main">
   <p:cSld>
     <p:spTree>
@@ -16871,7 +17293,7 @@
 </p:notes>
 </file>
 
-<file path=ppt/notesSlides/notesSlide7.xml><?xml version="1.0" encoding="utf-8"?>
+<file path=ppt/notesSlides/notesSlide9.xml><?xml version="1.0" encoding="utf-8"?>
 <p:notes xmlns:a="http://schemas.openxmlformats.org/drawingml/2006/main" xmlns:r="http://schemas.openxmlformats.org/officeDocument/2006/relationships" xmlns:p="http://schemas.openxmlformats.org/presentationml/2006/main">
   <p:cSld>
     <p:spTree>
@@ -16954,204 +17376,6 @@
     <p:extLst>
       <p:ext uri="{BB962C8B-B14F-4D97-AF65-F5344CB8AC3E}">
         <p14:creationId xmlns:p14="http://schemas.microsoft.com/office/powerpoint/2010/main" val="409166506"/>
-      </p:ext>
-    </p:extLst>
-  </p:cSld>
-  <p:clrMapOvr>
-    <a:masterClrMapping/>
-  </p:clrMapOvr>
-</p:notes>
-</file>
-
-<file path=ppt/notesSlides/notesSlide8.xml><?xml version="1.0" encoding="utf-8"?>
-<p:notes xmlns:a="http://schemas.openxmlformats.org/drawingml/2006/main" xmlns:r="http://schemas.openxmlformats.org/officeDocument/2006/relationships" xmlns:p="http://schemas.openxmlformats.org/presentationml/2006/main">
-  <p:cSld>
-    <p:spTree>
-      <p:nvGrpSpPr>
-        <p:cNvPr id="1" name=""/>
-        <p:cNvGrpSpPr/>
-        <p:nvPr/>
-      </p:nvGrpSpPr>
-      <p:grpSpPr>
-        <a:xfrm>
-          <a:off x="0" y="0"/>
-          <a:ext cx="0" cy="0"/>
-          <a:chOff x="0" y="0"/>
-          <a:chExt cx="0" cy="0"/>
-        </a:xfrm>
-      </p:grpSpPr>
-      <p:sp>
-        <p:nvSpPr>
-          <p:cNvPr id="2" name="Slide Image Placeholder 1"/>
-          <p:cNvSpPr>
-            <a:spLocks noGrp="1" noRot="1" noChangeAspect="1"/>
-          </p:cNvSpPr>
-          <p:nvPr>
-            <p:ph type="sldImg"/>
-          </p:nvPr>
-        </p:nvSpPr>
-        <p:spPr/>
-      </p:sp>
-      <p:sp>
-        <p:nvSpPr>
-          <p:cNvPr id="3" name="Notes Placeholder 2"/>
-          <p:cNvSpPr>
-            <a:spLocks noGrp="1"/>
-          </p:cNvSpPr>
-          <p:nvPr>
-            <p:ph type="body" idx="1"/>
-          </p:nvPr>
-        </p:nvSpPr>
-        <p:spPr/>
-        <p:txBody>
-          <a:bodyPr/>
-          <a:lstStyle/>
-          <a:p>
-            <a:r>
-              <a:rPr lang="en-US" dirty="0" smtClean="0"/>
-              <a:t>This data model is based on the user/system requirements.  The admin is also a Friends Chapter member who can update and delete</a:t>
-            </a:r>
-            <a:r>
-              <a:rPr lang="en-US" baseline="0" dirty="0" smtClean="0"/>
-              <a:t> all</a:t>
-            </a:r>
-            <a:r>
-              <a:rPr lang="en-US" dirty="0" smtClean="0"/>
-              <a:t> members profile.  Also,</a:t>
-            </a:r>
-            <a:r>
-              <a:rPr lang="en-US" baseline="0" dirty="0" smtClean="0"/>
-              <a:t> the admin can create, update, and delete other admin profile.  Therefore, the recursive relationship is used to define the admin-member relationship.</a:t>
-            </a:r>
-          </a:p>
-          <a:p>
-            <a:r>
-              <a:rPr lang="en-US" baseline="0" dirty="0" smtClean="0"/>
-              <a:t>The “projects” table is added here to identify the type of project in which a volunteer participated.</a:t>
-            </a:r>
-            <a:endParaRPr lang="en-US" dirty="0"/>
-          </a:p>
-        </p:txBody>
-      </p:sp>
-      <p:sp>
-        <p:nvSpPr>
-          <p:cNvPr id="4" name="Slide Number Placeholder 3"/>
-          <p:cNvSpPr>
-            <a:spLocks noGrp="1"/>
-          </p:cNvSpPr>
-          <p:nvPr>
-            <p:ph type="sldNum" sz="quarter" idx="10"/>
-          </p:nvPr>
-        </p:nvSpPr>
-        <p:spPr/>
-        <p:txBody>
-          <a:bodyPr/>
-          <a:lstStyle/>
-          <a:p>
-            <a:fld id="{EC08C6C5-DD63-4A3D-AD22-7D6D36F6A3FB}" type="slidenum">
-              <a:rPr lang="en-US" smtClean="0"/>
-              <a:t>16</a:t>
-            </a:fld>
-            <a:endParaRPr lang="en-US" dirty="0"/>
-          </a:p>
-        </p:txBody>
-      </p:sp>
-    </p:spTree>
-    <p:extLst>
-      <p:ext uri="{BB962C8B-B14F-4D97-AF65-F5344CB8AC3E}">
-        <p14:creationId xmlns:p14="http://schemas.microsoft.com/office/powerpoint/2010/main" val="2126180117"/>
-      </p:ext>
-    </p:extLst>
-  </p:cSld>
-  <p:clrMapOvr>
-    <a:masterClrMapping/>
-  </p:clrMapOvr>
-</p:notes>
-</file>
-
-<file path=ppt/notesSlides/notesSlide9.xml><?xml version="1.0" encoding="utf-8"?>
-<p:notes xmlns:a="http://schemas.openxmlformats.org/drawingml/2006/main" xmlns:r="http://schemas.openxmlformats.org/officeDocument/2006/relationships" xmlns:p="http://schemas.openxmlformats.org/presentationml/2006/main">
-  <p:cSld>
-    <p:spTree>
-      <p:nvGrpSpPr>
-        <p:cNvPr id="1" name=""/>
-        <p:cNvGrpSpPr/>
-        <p:nvPr/>
-      </p:nvGrpSpPr>
-      <p:grpSpPr>
-        <a:xfrm>
-          <a:off x="0" y="0"/>
-          <a:ext cx="0" cy="0"/>
-          <a:chOff x="0" y="0"/>
-          <a:chExt cx="0" cy="0"/>
-        </a:xfrm>
-      </p:grpSpPr>
-      <p:sp>
-        <p:nvSpPr>
-          <p:cNvPr id="2" name="Slide Image Placeholder 1"/>
-          <p:cNvSpPr>
-            <a:spLocks noGrp="1" noRot="1" noChangeAspect="1"/>
-          </p:cNvSpPr>
-          <p:nvPr>
-            <p:ph type="sldImg"/>
-          </p:nvPr>
-        </p:nvSpPr>
-        <p:spPr/>
-      </p:sp>
-      <p:sp>
-        <p:nvSpPr>
-          <p:cNvPr id="3" name="Notes Placeholder 2"/>
-          <p:cNvSpPr>
-            <a:spLocks noGrp="1"/>
-          </p:cNvSpPr>
-          <p:nvPr>
-            <p:ph type="body" idx="1"/>
-          </p:nvPr>
-        </p:nvSpPr>
-        <p:spPr/>
-        <p:txBody>
-          <a:bodyPr/>
-          <a:lstStyle/>
-          <a:p>
-            <a:r>
-              <a:rPr lang="en-US" dirty="0" smtClean="0"/>
-              <a:t>This is a</a:t>
-            </a:r>
-            <a:r>
-              <a:rPr lang="en-US" baseline="0" dirty="0" smtClean="0"/>
-              <a:t> suggested mobile mockup…….</a:t>
-            </a:r>
-            <a:endParaRPr lang="en-US" dirty="0"/>
-          </a:p>
-        </p:txBody>
-      </p:sp>
-      <p:sp>
-        <p:nvSpPr>
-          <p:cNvPr id="4" name="Slide Number Placeholder 3"/>
-          <p:cNvSpPr>
-            <a:spLocks noGrp="1"/>
-          </p:cNvSpPr>
-          <p:nvPr>
-            <p:ph type="sldNum" sz="quarter" idx="10"/>
-          </p:nvPr>
-        </p:nvSpPr>
-        <p:spPr/>
-        <p:txBody>
-          <a:bodyPr/>
-          <a:lstStyle/>
-          <a:p>
-            <a:fld id="{EC08C6C5-DD63-4A3D-AD22-7D6D36F6A3FB}" type="slidenum">
-              <a:rPr lang="en-US" smtClean="0"/>
-              <a:t>17</a:t>
-            </a:fld>
-            <a:endParaRPr lang="en-US" dirty="0"/>
-          </a:p>
-        </p:txBody>
-      </p:sp>
-    </p:spTree>
-    <p:extLst>
-      <p:ext uri="{BB962C8B-B14F-4D97-AF65-F5344CB8AC3E}">
-        <p14:creationId xmlns:p14="http://schemas.microsoft.com/office/powerpoint/2010/main" val="2140901243"/>
       </p:ext>
     </p:extLst>
   </p:cSld>
@@ -17342,7 +17566,7 @@
           <a:p>
             <a:fld id="{14973A1A-3B12-4F13-9E45-4B4F2CF06D13}" type="datetimeFigureOut">
               <a:rPr lang="en-US" smtClean="0"/>
-              <a:t>11/29/2017</a:t>
+              <a:t>12/8/2017</a:t>
             </a:fld>
             <a:endParaRPr lang="en-US" dirty="0"/>
           </a:p>
@@ -17553,7 +17777,7 @@
           <a:p>
             <a:fld id="{14973A1A-3B12-4F13-9E45-4B4F2CF06D13}" type="datetimeFigureOut">
               <a:rPr lang="en-US" smtClean="0"/>
-              <a:t>11/29/2017</a:t>
+              <a:t>12/8/2017</a:t>
             </a:fld>
             <a:endParaRPr lang="en-US" dirty="0"/>
           </a:p>
@@ -17733,7 +17957,7 @@
           <a:p>
             <a:fld id="{14973A1A-3B12-4F13-9E45-4B4F2CF06D13}" type="datetimeFigureOut">
               <a:rPr lang="en-US" smtClean="0"/>
-              <a:t>11/29/2017</a:t>
+              <a:t>12/8/2017</a:t>
             </a:fld>
             <a:endParaRPr lang="en-US" dirty="0"/>
           </a:p>
@@ -17903,7 +18127,7 @@
           <a:p>
             <a:fld id="{14973A1A-3B12-4F13-9E45-4B4F2CF06D13}" type="datetimeFigureOut">
               <a:rPr lang="en-US" smtClean="0"/>
-              <a:t>11/29/2017</a:t>
+              <a:t>12/8/2017</a:t>
             </a:fld>
             <a:endParaRPr lang="en-US" dirty="0"/>
           </a:p>
@@ -18190,7 +18414,7 @@
           <a:p>
             <a:fld id="{14973A1A-3B12-4F13-9E45-4B4F2CF06D13}" type="datetimeFigureOut">
               <a:rPr lang="en-US" smtClean="0"/>
-              <a:t>11/29/2017</a:t>
+              <a:t>12/8/2017</a:t>
             </a:fld>
             <a:endParaRPr lang="en-US" dirty="0"/>
           </a:p>
@@ -18478,7 +18702,7 @@
           <a:p>
             <a:fld id="{14973A1A-3B12-4F13-9E45-4B4F2CF06D13}" type="datetimeFigureOut">
               <a:rPr lang="en-US" smtClean="0"/>
-              <a:t>11/29/2017</a:t>
+              <a:t>12/8/2017</a:t>
             </a:fld>
             <a:endParaRPr lang="en-US" dirty="0"/>
           </a:p>
@@ -18900,7 +19124,7 @@
           <a:p>
             <a:fld id="{14973A1A-3B12-4F13-9E45-4B4F2CF06D13}" type="datetimeFigureOut">
               <a:rPr lang="en-US" smtClean="0"/>
-              <a:t>11/29/2017</a:t>
+              <a:t>12/8/2017</a:t>
             </a:fld>
             <a:endParaRPr lang="en-US" dirty="0"/>
           </a:p>
@@ -19018,7 +19242,7 @@
           <a:p>
             <a:fld id="{14973A1A-3B12-4F13-9E45-4B4F2CF06D13}" type="datetimeFigureOut">
               <a:rPr lang="en-US" smtClean="0"/>
-              <a:t>11/29/2017</a:t>
+              <a:t>12/8/2017</a:t>
             </a:fld>
             <a:endParaRPr lang="en-US" dirty="0"/>
           </a:p>
@@ -19113,7 +19337,7 @@
           <a:p>
             <a:fld id="{14973A1A-3B12-4F13-9E45-4B4F2CF06D13}" type="datetimeFigureOut">
               <a:rPr lang="en-US" smtClean="0"/>
-              <a:t>11/29/2017</a:t>
+              <a:t>12/8/2017</a:t>
             </a:fld>
             <a:endParaRPr lang="en-US" dirty="0"/>
           </a:p>
@@ -19390,7 +19614,7 @@
           <a:p>
             <a:fld id="{14973A1A-3B12-4F13-9E45-4B4F2CF06D13}" type="datetimeFigureOut">
               <a:rPr lang="en-US" smtClean="0"/>
-              <a:t>11/29/2017</a:t>
+              <a:t>12/8/2017</a:t>
             </a:fld>
             <a:endParaRPr lang="en-US" dirty="0"/>
           </a:p>
@@ -19643,7 +19867,7 @@
           <a:p>
             <a:fld id="{14973A1A-3B12-4F13-9E45-4B4F2CF06D13}" type="datetimeFigureOut">
               <a:rPr lang="en-US" smtClean="0"/>
-              <a:t>11/29/2017</a:t>
+              <a:t>12/8/2017</a:t>
             </a:fld>
             <a:endParaRPr lang="en-US" dirty="0"/>
           </a:p>
@@ -19866,7 +20090,7 @@
           <a:p>
             <a:fld id="{14973A1A-3B12-4F13-9E45-4B4F2CF06D13}" type="datetimeFigureOut">
               <a:rPr lang="en-US" smtClean="0"/>
-              <a:t>11/29/2017</a:t>
+              <a:t>12/8/2017</a:t>
             </a:fld>
             <a:endParaRPr lang="en-US" dirty="0"/>
           </a:p>
@@ -22197,14 +22421,14 @@
           <p:nvPr>
             <p:extLst>
               <p:ext uri="{D42A27DB-BD31-4B8C-83A1-F6EECF244321}">
-                <p14:modId xmlns:p14="http://schemas.microsoft.com/office/powerpoint/2010/main" val="2669046300"/>
+                <p14:modId xmlns:p14="http://schemas.microsoft.com/office/powerpoint/2010/main" val="3398107399"/>
               </p:ext>
             </p:extLst>
           </p:nvPr>
         </p:nvGraphicFramePr>
         <p:xfrm>
           <a:off x="119004" y="1560848"/>
-          <a:ext cx="8921500" cy="5100828"/>
+          <a:ext cx="8921500" cy="5096256"/>
         </p:xfrm>
         <a:graphic>
           <a:graphicData uri="http://schemas.openxmlformats.org/drawingml/2006/table">
@@ -26011,7 +26235,31 @@
                           <a:ea typeface="Calibri"/>
                           <a:cs typeface="Arial" panose="020B0604020202020204" pitchFamily="34" charset="0"/>
                         </a:rPr>
-                        <a:t>Rebuilding the Website</a:t>
+                        <a:t>Rebuilding the </a:t>
+                      </a:r>
+                      <a:r>
+                        <a:rPr lang="en-US" sz="1400" b="1" dirty="0" smtClean="0">
+                          <a:solidFill>
+                            <a:schemeClr val="tx1"/>
+                          </a:solidFill>
+                          <a:effectLst/>
+                          <a:latin typeface="Arial" panose="020B0604020202020204" pitchFamily="34" charset="0"/>
+                          <a:ea typeface="Calibri"/>
+                          <a:cs typeface="Arial" panose="020B0604020202020204" pitchFamily="34" charset="0"/>
+                        </a:rPr>
+                        <a:t>Website/Volunteer</a:t>
+                      </a:r>
+                      <a:r>
+                        <a:rPr lang="en-US" sz="1400" b="1" baseline="0" dirty="0" smtClean="0">
+                          <a:solidFill>
+                            <a:schemeClr val="tx1"/>
+                          </a:solidFill>
+                          <a:effectLst/>
+                          <a:latin typeface="Arial" panose="020B0604020202020204" pitchFamily="34" charset="0"/>
+                          <a:ea typeface="Calibri"/>
+                          <a:cs typeface="Arial" panose="020B0604020202020204" pitchFamily="34" charset="0"/>
+                        </a:rPr>
+                        <a:t> App</a:t>
                       </a:r>
                       <a:endParaRPr lang="en-US" sz="1400" dirty="0">
                         <a:solidFill>
@@ -26436,7 +26684,19 @@
                           <a:ea typeface="Calibri"/>
                           <a:cs typeface="Arial" panose="020B0604020202020204" pitchFamily="34" charset="0"/>
                         </a:rPr>
-                        <a:t>First Increment Version of Website</a:t>
+                        <a:t>First Increment Version of </a:t>
+                      </a:r>
+                      <a:r>
+                        <a:rPr lang="en-US" sz="1400" b="1" dirty="0" smtClean="0">
+                          <a:solidFill>
+                            <a:schemeClr val="tx1"/>
+                          </a:solidFill>
+                          <a:effectLst/>
+                          <a:latin typeface="Arial" panose="020B0604020202020204" pitchFamily="34" charset="0"/>
+                          <a:ea typeface="Calibri"/>
+                          <a:cs typeface="Arial" panose="020B0604020202020204" pitchFamily="34" charset="0"/>
+                        </a:rPr>
+                        <a:t>Site/App</a:t>
                       </a:r>
                       <a:endParaRPr lang="en-US" sz="1400" dirty="0">
                         <a:solidFill>
@@ -26861,7 +27121,19 @@
                           <a:ea typeface="Calibri"/>
                           <a:cs typeface="Arial" panose="020B0604020202020204" pitchFamily="34" charset="0"/>
                         </a:rPr>
-                        <a:t>Rebuilding the Entire Website</a:t>
+                        <a:t>Rebuilding the Entire </a:t>
+                      </a:r>
+                      <a:r>
+                        <a:rPr lang="en-US" sz="1400" b="1" dirty="0" smtClean="0">
+                          <a:solidFill>
+                            <a:schemeClr val="tx1"/>
+                          </a:solidFill>
+                          <a:effectLst/>
+                          <a:latin typeface="Arial" panose="020B0604020202020204" pitchFamily="34" charset="0"/>
+                          <a:ea typeface="Calibri"/>
+                          <a:cs typeface="Arial" panose="020B0604020202020204" pitchFamily="34" charset="0"/>
+                        </a:rPr>
+                        <a:t>Site/App</a:t>
                       </a:r>
                       <a:endParaRPr lang="en-US" sz="1400" dirty="0">
                         <a:solidFill>
@@ -27286,7 +27558,19 @@
                           <a:ea typeface="Calibri"/>
                           <a:cs typeface="Arial" panose="020B0604020202020204" pitchFamily="34" charset="0"/>
                         </a:rPr>
-                        <a:t>Final Rebuild of Website</a:t>
+                        <a:t>Final Rebuild of </a:t>
+                      </a:r>
+                      <a:r>
+                        <a:rPr lang="en-US" sz="1400" b="1" dirty="0" smtClean="0">
+                          <a:solidFill>
+                            <a:schemeClr val="tx1"/>
+                          </a:solidFill>
+                          <a:effectLst/>
+                          <a:latin typeface="Arial" panose="020B0604020202020204" pitchFamily="34" charset="0"/>
+                          <a:ea typeface="Calibri"/>
+                          <a:cs typeface="Arial" panose="020B0604020202020204" pitchFamily="34" charset="0"/>
+                        </a:rPr>
+                        <a:t>Website/App</a:t>
                       </a:r>
                       <a:endParaRPr lang="en-US" sz="1400" dirty="0">
                         <a:solidFill>
@@ -29746,7 +30030,7 @@
           <p:spPr>
             <a:xfrm>
               <a:off x="7726680" y="5143501"/>
-              <a:ext cx="685800" cy="228600"/>
+              <a:ext cx="457200" cy="228600"/>
             </a:xfrm>
             <a:prstGeom prst="rect">
               <a:avLst/>
@@ -29788,8 +30072,8 @@
           </p:nvSpPr>
           <p:spPr>
             <a:xfrm>
-              <a:off x="8139752" y="5423848"/>
-              <a:ext cx="365760" cy="201168"/>
+              <a:off x="8001000" y="5423848"/>
+              <a:ext cx="228600" cy="201168"/>
             </a:xfrm>
             <a:prstGeom prst="rect">
               <a:avLst/>
@@ -29831,8 +30115,8 @@
           </p:nvSpPr>
           <p:spPr>
             <a:xfrm>
-              <a:off x="8354704" y="5665048"/>
-              <a:ext cx="274320" cy="192024"/>
+              <a:off x="8229600" y="5665048"/>
+              <a:ext cx="365760" cy="192024"/>
             </a:xfrm>
             <a:prstGeom prst="rect">
               <a:avLst/>
@@ -30626,7 +30910,7 @@
           <p:nvPr/>
         </p:nvPicPr>
         <p:blipFill>
-          <a:blip r:embed="rId2">
+          <a:blip r:embed="rId3">
             <a:extLst>
               <a:ext uri="{28A0092B-C50C-407E-A947-70E740481C1C}">
                 <a14:useLocalDpi xmlns:a14="http://schemas.microsoft.com/office/drawing/2010/main" val="0"/>
@@ -30680,7 +30964,7 @@
           <p:nvPr/>
         </p:nvPicPr>
         <p:blipFill>
-          <a:blip r:embed="rId3">
+          <a:blip r:embed="rId4">
             <a:extLst>
               <a:ext uri="{28A0092B-C50C-407E-A947-70E740481C1C}">
                 <a14:useLocalDpi xmlns:a14="http://schemas.microsoft.com/office/drawing/2010/main" val="0"/>
@@ -30981,8 +31265,8 @@
         </p:nvCxnSpPr>
         <p:spPr>
           <a:xfrm flipH="1">
-            <a:off x="1905000" y="2719021"/>
-            <a:ext cx="5369588" cy="2919779"/>
+            <a:off x="2362200" y="2719021"/>
+            <a:ext cx="4912388" cy="2310179"/>
           </a:xfrm>
           <a:prstGeom prst="straightConnector1">
             <a:avLst/>
@@ -31713,12 +31997,12 @@
         <p:spPr>
           <a:xfrm>
             <a:off x="533400" y="1371600"/>
-            <a:ext cx="8229600" cy="5029200"/>
+            <a:ext cx="8382000" cy="5029200"/>
           </a:xfrm>
         </p:spPr>
         <p:txBody>
           <a:bodyPr>
-            <a:normAutofit/>
+            <a:normAutofit lnSpcReduction="10000"/>
           </a:bodyPr>
           <a:lstStyle/>
           <a:p>
@@ -31740,7 +32024,7 @@
             </a:pPr>
             <a:r>
               <a:rPr lang="en-US" dirty="0" smtClean="0"/>
-              <a:t>Difficult to update/maintain site and app</a:t>
+              <a:t>Difficult to update/maintain site and Volunteer app</a:t>
             </a:r>
           </a:p>
           <a:p>
@@ -31762,7 +32046,7 @@
             </a:pPr>
             <a:r>
               <a:rPr lang="en-US" dirty="0" smtClean="0"/>
-              <a:t>Illogical Menu Structure</a:t>
+              <a:t>Degraded site security</a:t>
             </a:r>
             <a:endParaRPr lang="en-US" dirty="0"/>
           </a:p>
@@ -31796,7 +32080,18 @@
             </a:pPr>
             <a:r>
               <a:rPr lang="en-US" dirty="0" smtClean="0"/>
-              <a:t>Establish Admin Documentation</a:t>
+              <a:t>Site hosting either 1&amp;1.com or Bluehost</a:t>
+            </a:r>
+          </a:p>
+          <a:p>
+            <a:pPr lvl="1">
+              <a:spcBef>
+                <a:spcPts val="1200"/>
+              </a:spcBef>
+            </a:pPr>
+            <a:r>
+              <a:rPr lang="en-US" dirty="0" smtClean="0"/>
+              <a:t>Establish detailed Admin Documentation</a:t>
             </a:r>
           </a:p>
           <a:p>

</xml_diff>